<commit_message>
Add one page PPT
</commit_message>
<xml_diff>
--- a/project_presentation_rev.pptx
+++ b/project_presentation_rev.pptx
@@ -16,12 +16,13 @@
     <p:sldId id="263" r:id="rId10"/>
     <p:sldId id="275" r:id="rId11"/>
     <p:sldId id="264" r:id="rId12"/>
-    <p:sldId id="261" r:id="rId13"/>
-    <p:sldId id="276" r:id="rId14"/>
-    <p:sldId id="270" r:id="rId15"/>
-    <p:sldId id="262" r:id="rId16"/>
-    <p:sldId id="272" r:id="rId17"/>
-    <p:sldId id="265" r:id="rId18"/>
+    <p:sldId id="278" r:id="rId13"/>
+    <p:sldId id="261" r:id="rId14"/>
+    <p:sldId id="276" r:id="rId15"/>
+    <p:sldId id="270" r:id="rId16"/>
+    <p:sldId id="262" r:id="rId17"/>
+    <p:sldId id="272" r:id="rId18"/>
+    <p:sldId id="265" r:id="rId19"/>
   </p:sldIdLst>
   <p:sldSz cx="9144000" cy="6858000" type="screen4x3"/>
   <p:notesSz cx="6858000" cy="9144000"/>
@@ -122,7 +123,7 @@
   </p:defaultTextStyle>
   <p:extLst>
     <p:ext uri="{EFAFB233-063F-42B5-8137-9DF3F51BA10A}">
-      <p15:sldGuideLst xmlns:p15="http://schemas.microsoft.com/office/powerpoint/2012/main">
+      <p15:sldGuideLst xmlns:p15="http://schemas.microsoft.com/office/powerpoint/2012/main" xmlns="">
         <p15:guide id="1" orient="horz" pos="2160">
           <p15:clr>
             <a:srgbClr val="A4A3A4"/>
@@ -338,7 +339,7 @@
           <a:lstStyle/>
           <a:p>
             <a:fld id="{8BEEBAAA-29B5-4AF5-BC5F-7E580C29002D}" type="datetimeFigureOut">
-              <a:rPr altLang="en-US">
+              <a:rPr lang="en-US" altLang="en-US">
                 <a:solidFill>
                   <a:prstClr val="black">
                     <a:tint val="75000"/>
@@ -346,7 +347,7 @@
                 </a:solidFill>
               </a:rPr>
               <a:pPr/>
-              <a:t>2015/3/10</a:t>
+              <a:t>15/3/11</a:t>
             </a:fld>
             <a:endParaRPr altLang="en-US">
               <a:solidFill>
@@ -655,7 +656,7 @@
           <a:lstStyle/>
           <a:p>
             <a:fld id="{8BEEBAAA-29B5-4AF5-BC5F-7E580C29002D}" type="datetimeFigureOut">
-              <a:rPr altLang="en-US">
+              <a:rPr lang="en-US" altLang="en-US">
                 <a:solidFill>
                   <a:prstClr val="black">
                     <a:tint val="75000"/>
@@ -663,7 +664,7 @@
                 </a:solidFill>
               </a:rPr>
               <a:pPr/>
-              <a:t>2015/3/10</a:t>
+              <a:t>15/3/11</a:t>
             </a:fld>
             <a:endParaRPr altLang="en-US">
               <a:solidFill>
@@ -977,7 +978,7 @@
           <a:lstStyle/>
           <a:p>
             <a:fld id="{8BEEBAAA-29B5-4AF5-BC5F-7E580C29002D}" type="datetimeFigureOut">
-              <a:rPr altLang="en-US">
+              <a:rPr lang="en-US" altLang="en-US">
                 <a:solidFill>
                   <a:prstClr val="black">
                     <a:tint val="75000"/>
@@ -985,7 +986,7 @@
                 </a:solidFill>
               </a:rPr>
               <a:pPr/>
-              <a:t>2015/3/10</a:t>
+              <a:t>15/3/11</a:t>
             </a:fld>
             <a:endParaRPr altLang="en-US">
               <a:solidFill>
@@ -1378,7 +1379,7 @@
           <a:lstStyle/>
           <a:p>
             <a:fld id="{8BEEBAAA-29B5-4AF5-BC5F-7E580C29002D}" type="datetimeFigureOut">
-              <a:rPr altLang="en-US">
+              <a:rPr lang="en-US" altLang="en-US">
                 <a:solidFill>
                   <a:prstClr val="black">
                     <a:tint val="75000"/>
@@ -1386,7 +1387,7 @@
                 </a:solidFill>
               </a:rPr>
               <a:pPr/>
-              <a:t>2015/3/10</a:t>
+              <a:t>15/3/11</a:t>
             </a:fld>
             <a:endParaRPr altLang="en-US">
               <a:solidFill>
@@ -1718,7 +1719,7 @@
           <a:lstStyle/>
           <a:p>
             <a:fld id="{8BEEBAAA-29B5-4AF5-BC5F-7E580C29002D}" type="datetimeFigureOut">
-              <a:rPr altLang="en-US">
+              <a:rPr lang="en-US" altLang="en-US">
                 <a:solidFill>
                   <a:prstClr val="black">
                     <a:tint val="75000"/>
@@ -1726,7 +1727,7 @@
                 </a:solidFill>
               </a:rPr>
               <a:pPr/>
-              <a:t>2015/3/10</a:t>
+              <a:t>15/3/11</a:t>
             </a:fld>
             <a:endParaRPr altLang="en-US">
               <a:solidFill>
@@ -2273,7 +2274,7 @@
           <a:lstStyle/>
           <a:p>
             <a:fld id="{8BEEBAAA-29B5-4AF5-BC5F-7E580C29002D}" type="datetimeFigureOut">
-              <a:rPr altLang="en-US">
+              <a:rPr lang="en-US" altLang="en-US">
                 <a:solidFill>
                   <a:prstClr val="black">
                     <a:tint val="75000"/>
@@ -2281,7 +2282,7 @@
                 </a:solidFill>
               </a:rPr>
               <a:pPr/>
-              <a:t>2015/3/10</a:t>
+              <a:t>15/3/11</a:t>
             </a:fld>
             <a:endParaRPr altLang="en-US">
               <a:solidFill>
@@ -2958,7 +2959,7 @@
           <a:lstStyle/>
           <a:p>
             <a:fld id="{8BEEBAAA-29B5-4AF5-BC5F-7E580C29002D}" type="datetimeFigureOut">
-              <a:rPr altLang="en-US">
+              <a:rPr lang="en-US" altLang="en-US">
                 <a:solidFill>
                   <a:prstClr val="black">
                     <a:tint val="75000"/>
@@ -2966,7 +2967,7 @@
                 </a:solidFill>
               </a:rPr>
               <a:pPr/>
-              <a:t>2015/3/10</a:t>
+              <a:t>15/3/11</a:t>
             </a:fld>
             <a:endParaRPr altLang="en-US">
               <a:solidFill>
@@ -3223,7 +3224,7 @@
           <a:lstStyle/>
           <a:p>
             <a:fld id="{8BEEBAAA-29B5-4AF5-BC5F-7E580C29002D}" type="datetimeFigureOut">
-              <a:rPr altLang="en-US">
+              <a:rPr lang="en-US" altLang="en-US">
                 <a:solidFill>
                   <a:prstClr val="black">
                     <a:tint val="75000"/>
@@ -3231,7 +3232,7 @@
                 </a:solidFill>
               </a:rPr>
               <a:pPr/>
-              <a:t>2015/3/10</a:t>
+              <a:t>15/3/11</a:t>
             </a:fld>
             <a:endParaRPr altLang="en-US">
               <a:solidFill>
@@ -3400,7 +3401,7 @@
           <a:lstStyle/>
           <a:p>
             <a:fld id="{8BEEBAAA-29B5-4AF5-BC5F-7E580C29002D}" type="datetimeFigureOut">
-              <a:rPr altLang="en-US">
+              <a:rPr lang="en-US" altLang="en-US">
                 <a:solidFill>
                   <a:prstClr val="black">
                     <a:tint val="75000"/>
@@ -3408,7 +3409,7 @@
                 </a:solidFill>
               </a:rPr>
               <a:pPr/>
-              <a:t>2015/3/10</a:t>
+              <a:t>15/3/11</a:t>
             </a:fld>
             <a:endParaRPr altLang="en-US">
               <a:solidFill>
@@ -3769,7 +3770,7 @@
           <a:lstStyle/>
           <a:p>
             <a:fld id="{8BEEBAAA-29B5-4AF5-BC5F-7E580C29002D}" type="datetimeFigureOut">
-              <a:rPr altLang="en-US">
+              <a:rPr lang="en-US" altLang="en-US">
                 <a:solidFill>
                   <a:prstClr val="black">
                     <a:tint val="75000"/>
@@ -3777,7 +3778,7 @@
                 </a:solidFill>
               </a:rPr>
               <a:pPr/>
-              <a:t>2015/3/10</a:t>
+              <a:t>15/3/11</a:t>
             </a:fld>
             <a:endParaRPr altLang="en-US">
               <a:solidFill>
@@ -4058,7 +4059,7 @@
           <a:lstStyle/>
           <a:p>
             <a:fld id="{8BEEBAAA-29B5-4AF5-BC5F-7E580C29002D}" type="datetimeFigureOut">
-              <a:rPr altLang="en-US">
+              <a:rPr lang="en-US" altLang="en-US">
                 <a:solidFill>
                   <a:prstClr val="black">
                     <a:tint val="75000"/>
@@ -4066,7 +4067,7 @@
                 </a:solidFill>
               </a:rPr>
               <a:pPr/>
-              <a:t>2015/3/10</a:t>
+              <a:t>15/3/11</a:t>
             </a:fld>
             <a:endParaRPr altLang="en-US">
               <a:solidFill>
@@ -4312,7 +4313,7 @@
                 </a:solidFill>
               </a:rPr>
               <a:pPr defTabSz="914400"/>
-              <a:t>3/10/2015</a:t>
+              <a:t>15/3/11</a:t>
             </a:fld>
             <a:endParaRPr altLang="en-US">
               <a:solidFill>
@@ -5037,7 +5038,7 @@
   <p:timing>
     <p:tnLst>
       <p:par>
-        <p:cTn id="1" dur="indefinite" restart="never" nodeType="tmRoot"/>
+        <p:cTn xmlns:p14="http://schemas.microsoft.com/office/powerpoint/2010/main" id="1" dur="indefinite" restart="never" nodeType="tmRoot"/>
       </p:par>
     </p:tnLst>
   </p:timing>
@@ -5262,7 +5263,7 @@
               <a:tabLst/>
               <a:defRPr/>
             </a:pPr>
-            <a:endParaRPr kumimoji="1" lang="en-US" altLang="zh-CN" sz="2800" b="0" i="0" u="none" strike="noStrike" kern="1200" cap="none" spc="0" normalizeH="0" baseline="0" noProof="0" smtClean="0">
+            <a:endParaRPr kumimoji="1" lang="en-US" altLang="zh-CN" sz="2800" b="0" i="0" u="none" strike="noStrike" kern="1200" cap="none" spc="0" normalizeH="0" baseline="0" noProof="0" dirty="0" smtClean="0">
               <a:ln>
                 <a:noFill/>
               </a:ln>
@@ -5296,7 +5297,7 @@
               <a:defRPr/>
             </a:pPr>
             <a:r>
-              <a:rPr kumimoji="1" lang="en-US" altLang="zh-CN" sz="2800" b="0" i="0" u="none" strike="noStrike" kern="1200" cap="none" spc="0" normalizeH="0" baseline="0" noProof="0" smtClean="0">
+              <a:rPr kumimoji="1" lang="en-US" altLang="zh-CN" sz="2800" b="0" i="0" u="none" strike="noStrike" kern="1200" cap="none" spc="0" normalizeH="0" baseline="0" noProof="0" dirty="0" smtClean="0">
                 <a:ln>
                   <a:noFill/>
                 </a:ln>
@@ -5332,7 +5333,7 @@
               <a:defRPr/>
             </a:pPr>
             <a:r>
-              <a:rPr kumimoji="1" lang="en-US" altLang="zh-CN" sz="2800" b="0" i="0" u="none" strike="noStrike" kern="1200" cap="none" spc="0" normalizeH="0" baseline="0" noProof="0" smtClean="0">
+              <a:rPr kumimoji="1" lang="en-US" altLang="zh-CN" sz="2800" b="0" i="0" u="none" strike="noStrike" kern="1200" cap="none" spc="0" normalizeH="0" baseline="0" noProof="0" dirty="0" smtClean="0">
                 <a:ln>
                   <a:noFill/>
                 </a:ln>
@@ -5368,7 +5369,7 @@
               <a:defRPr/>
             </a:pPr>
             <a:r>
-              <a:rPr kumimoji="1" lang="en-US" altLang="zh-CN" sz="2800" b="0" i="0" u="none" strike="noStrike" kern="1200" cap="none" spc="0" normalizeH="0" baseline="0" noProof="0" smtClean="0">
+              <a:rPr kumimoji="1" lang="en-US" altLang="zh-CN" sz="2800" b="0" i="0" u="none" strike="noStrike" kern="1200" cap="none" spc="0" normalizeH="0" baseline="0" noProof="0" dirty="0" smtClean="0">
                 <a:ln>
                   <a:noFill/>
                 </a:ln>
@@ -5404,7 +5405,7 @@
               <a:defRPr/>
             </a:pPr>
             <a:r>
-              <a:rPr kumimoji="1" lang="en-US" altLang="zh-CN" sz="2400" b="0" i="0" u="none" strike="noStrike" kern="1200" cap="none" spc="0" normalizeH="0" baseline="0" noProof="0" smtClean="0">
+              <a:rPr kumimoji="1" lang="en-US" altLang="zh-CN" sz="2400" b="0" i="0" u="none" strike="noStrike" kern="1200" cap="none" spc="0" normalizeH="0" baseline="0" noProof="0" dirty="0" smtClean="0">
                 <a:ln>
                   <a:noFill/>
                 </a:ln>
@@ -5420,20 +5421,6 @@
               </a:rPr>
               <a:t>Combine classifiers by averaging all the single trees.</a:t>
             </a:r>
-            <a:endParaRPr kumimoji="1" lang="en-US" altLang="zh-CN" sz="2400" b="0" i="0" u="none" strike="noStrike" kern="1200" cap="none" spc="0" normalizeH="0" baseline="0" noProof="0" dirty="0" smtClean="0">
-              <a:ln>
-                <a:noFill/>
-              </a:ln>
-              <a:solidFill>
-                <a:sysClr val="windowText" lastClr="000000"/>
-              </a:solidFill>
-              <a:effectLst/>
-              <a:uLnTx/>
-              <a:uFillTx/>
-              <a:latin typeface="Calibri"/>
-              <a:ea typeface="宋体" panose="02010600030101010101" pitchFamily="2" charset="-122"/>
-              <a:cs typeface="+mn-cs"/>
-            </a:endParaRPr>
           </a:p>
         </p:txBody>
       </p:sp>
@@ -5643,7 +5630,7 @@
               <a:tabLst/>
               <a:defRPr/>
             </a:pPr>
-            <a:endParaRPr kumimoji="1" lang="en-US" altLang="zh-CN" sz="2800" b="0" i="0" u="none" strike="noStrike" kern="1200" cap="none" spc="0" normalizeH="0" baseline="0" noProof="0" smtClean="0">
+            <a:endParaRPr kumimoji="1" lang="en-US" altLang="zh-CN" sz="2800" b="0" i="0" u="none" strike="noStrike" kern="1200" cap="none" spc="0" normalizeH="0" baseline="0" noProof="0" dirty="0" smtClean="0">
               <a:ln>
                 <a:noFill/>
               </a:ln>
@@ -5676,7 +5663,7 @@
               <a:tabLst/>
               <a:defRPr/>
             </a:pPr>
-            <a:endParaRPr kumimoji="1" lang="en-US" altLang="zh-CN" sz="2800" b="0" i="0" u="none" strike="noStrike" kern="1200" cap="none" spc="0" normalizeH="0" baseline="0" noProof="0" smtClean="0">
+            <a:endParaRPr kumimoji="1" lang="en-US" altLang="zh-CN" sz="2800" b="0" i="0" u="none" strike="noStrike" kern="1200" cap="none" spc="0" normalizeH="0" baseline="0" noProof="0" dirty="0" smtClean="0">
               <a:ln>
                 <a:noFill/>
               </a:ln>
@@ -5709,7 +5696,7 @@
               <a:tabLst/>
               <a:defRPr/>
             </a:pPr>
-            <a:endParaRPr kumimoji="1" lang="en-US" altLang="zh-CN" sz="2800" b="0" i="0" u="none" strike="noStrike" kern="1200" cap="none" spc="0" normalizeH="0" baseline="0" noProof="0" smtClean="0">
+            <a:endParaRPr kumimoji="1" lang="en-US" altLang="zh-CN" sz="2800" b="0" i="0" u="none" strike="noStrike" kern="1200" cap="none" spc="0" normalizeH="0" baseline="0" noProof="0" dirty="0" smtClean="0">
               <a:ln>
                 <a:noFill/>
               </a:ln>
@@ -5743,7 +5730,7 @@
               <a:defRPr/>
             </a:pPr>
             <a:r>
-              <a:rPr kumimoji="1" lang="en-US" altLang="zh-CN" sz="2800" b="0" i="0" u="none" strike="noStrike" kern="1200" cap="none" spc="0" normalizeH="0" baseline="0" noProof="0" smtClean="0">
+              <a:rPr kumimoji="1" lang="en-US" altLang="zh-CN" sz="2800" b="0" i="0" u="none" strike="noStrike" kern="1200" cap="none" spc="0" normalizeH="0" baseline="0" noProof="0" dirty="0" smtClean="0">
                 <a:ln>
                   <a:noFill/>
                 </a:ln>
@@ -5779,7 +5766,7 @@
               <a:defRPr/>
             </a:pPr>
             <a:r>
-              <a:rPr kumimoji="1" lang="en-US" altLang="zh-CN" sz="2800" b="0" i="0" u="none" strike="noStrike" kern="1200" cap="none" spc="0" normalizeH="0" baseline="0" noProof="0" smtClean="0">
+              <a:rPr kumimoji="1" lang="en-US" altLang="zh-CN" sz="2800" b="0" i="0" u="none" strike="noStrike" kern="1200" cap="none" spc="0" normalizeH="0" baseline="0" noProof="0" dirty="0" smtClean="0">
                 <a:ln>
                   <a:noFill/>
                 </a:ln>
@@ -5815,7 +5802,7 @@
               <a:defRPr/>
             </a:pPr>
             <a:r>
-              <a:rPr kumimoji="1" lang="en-US" altLang="zh-CN" sz="2400" b="0" i="0" u="none" strike="noStrike" kern="1200" cap="none" spc="0" normalizeH="0" baseline="0" noProof="0" smtClean="0">
+              <a:rPr kumimoji="1" lang="en-US" altLang="zh-CN" sz="2400" b="0" i="0" u="none" strike="noStrike" kern="1200" cap="none" spc="0" normalizeH="0" baseline="0" noProof="0" dirty="0" smtClean="0">
                 <a:ln>
                   <a:noFill/>
                 </a:ln>
@@ -5831,20 +5818,6 @@
               </a:rPr>
               <a:t>Independent assumption</a:t>
             </a:r>
-            <a:endParaRPr kumimoji="1" lang="en-US" altLang="zh-CN" sz="2400" b="0" i="0" u="none" strike="noStrike" kern="1200" cap="none" spc="0" normalizeH="0" baseline="0" noProof="0" dirty="0" smtClean="0">
-              <a:ln>
-                <a:noFill/>
-              </a:ln>
-              <a:solidFill>
-                <a:sysClr val="windowText" lastClr="000000"/>
-              </a:solidFill>
-              <a:effectLst/>
-              <a:uLnTx/>
-              <a:uFillTx/>
-              <a:latin typeface="Calibri"/>
-              <a:ea typeface="宋体" panose="02010600030101010101" pitchFamily="2" charset="-122"/>
-              <a:cs typeface="+mn-cs"/>
-            </a:endParaRPr>
           </a:p>
         </p:txBody>
       </p:sp>
@@ -5909,6 +5882,1174 @@
 </file>
 
 <file path=ppt/slides/slide12.xml><?xml version="1.0" encoding="utf-8"?>
+<p:sld xmlns:a="http://schemas.openxmlformats.org/drawingml/2006/main" xmlns:r="http://schemas.openxmlformats.org/officeDocument/2006/relationships" xmlns:p="http://schemas.openxmlformats.org/presentationml/2006/main">
+  <p:cSld>
+    <p:spTree>
+      <p:nvGrpSpPr>
+        <p:cNvPr id="1" name=""/>
+        <p:cNvGrpSpPr/>
+        <p:nvPr/>
+      </p:nvGrpSpPr>
+      <p:grpSpPr>
+        <a:xfrm>
+          <a:off x="0" y="0"/>
+          <a:ext cx="0" cy="0"/>
+          <a:chOff x="0" y="0"/>
+          <a:chExt cx="0" cy="0"/>
+        </a:xfrm>
+      </p:grpSpPr>
+      <p:sp>
+        <p:nvSpPr>
+          <p:cNvPr id="8" name="内容占位符 2"/>
+          <p:cNvSpPr txBox="1">
+            <a:spLocks/>
+          </p:cNvSpPr>
+          <p:nvPr/>
+        </p:nvSpPr>
+        <p:spPr>
+          <a:xfrm>
+            <a:off x="457200" y="1417638"/>
+            <a:ext cx="8229600" cy="4708525"/>
+          </a:xfrm>
+          <a:prstGeom prst="rect">
+            <a:avLst/>
+          </a:prstGeom>
+        </p:spPr>
+        <p:txBody>
+          <a:bodyPr vert="horz" lIns="91440" tIns="45720" rIns="91440" bIns="45720" rtlCol="0">
+            <a:normAutofit/>
+          </a:bodyPr>
+          <a:lstStyle>
+            <a:lvl1pPr marL="342900" indent="-342900" algn="l" defTabSz="457200" rtl="0" eaLnBrk="1" latinLnBrk="0" hangingPunct="1">
+              <a:spcBef>
+                <a:spcPct val="20000"/>
+              </a:spcBef>
+              <a:buFont typeface="Arial"/>
+              <a:buChar char="•"/>
+              <a:defRPr sz="3200" kern="1200">
+                <a:solidFill>
+                  <a:schemeClr val="tx1"/>
+                </a:solidFill>
+                <a:latin typeface="+mn-lt"/>
+                <a:ea typeface="+mn-ea"/>
+                <a:cs typeface="+mn-cs"/>
+              </a:defRPr>
+            </a:lvl1pPr>
+            <a:lvl2pPr marL="742950" indent="-285750" algn="l" defTabSz="457200" rtl="0" eaLnBrk="1" latinLnBrk="0" hangingPunct="1">
+              <a:spcBef>
+                <a:spcPct val="20000"/>
+              </a:spcBef>
+              <a:buFont typeface="Arial"/>
+              <a:buChar char="–"/>
+              <a:defRPr sz="2800" kern="1200">
+                <a:solidFill>
+                  <a:schemeClr val="tx1"/>
+                </a:solidFill>
+                <a:latin typeface="+mn-lt"/>
+                <a:ea typeface="+mn-ea"/>
+                <a:cs typeface="+mn-cs"/>
+              </a:defRPr>
+            </a:lvl2pPr>
+            <a:lvl3pPr marL="1143000" indent="-228600" algn="l" defTabSz="457200" rtl="0" eaLnBrk="1" latinLnBrk="0" hangingPunct="1">
+              <a:spcBef>
+                <a:spcPct val="20000"/>
+              </a:spcBef>
+              <a:buFont typeface="Arial"/>
+              <a:buChar char="•"/>
+              <a:defRPr sz="2400" kern="1200">
+                <a:solidFill>
+                  <a:schemeClr val="tx1"/>
+                </a:solidFill>
+                <a:latin typeface="+mn-lt"/>
+                <a:ea typeface="+mn-ea"/>
+                <a:cs typeface="+mn-cs"/>
+              </a:defRPr>
+            </a:lvl3pPr>
+            <a:lvl4pPr marL="1600200" indent="-228600" algn="l" defTabSz="457200" rtl="0" eaLnBrk="1" latinLnBrk="0" hangingPunct="1">
+              <a:spcBef>
+                <a:spcPct val="20000"/>
+              </a:spcBef>
+              <a:buFont typeface="Arial"/>
+              <a:buChar char="–"/>
+              <a:defRPr sz="2000" kern="1200">
+                <a:solidFill>
+                  <a:schemeClr val="tx1"/>
+                </a:solidFill>
+                <a:latin typeface="+mn-lt"/>
+                <a:ea typeface="+mn-ea"/>
+                <a:cs typeface="+mn-cs"/>
+              </a:defRPr>
+            </a:lvl4pPr>
+            <a:lvl5pPr marL="2057400" indent="-228600" algn="l" defTabSz="457200" rtl="0" eaLnBrk="1" latinLnBrk="0" hangingPunct="1">
+              <a:spcBef>
+                <a:spcPct val="20000"/>
+              </a:spcBef>
+              <a:buFont typeface="Arial"/>
+              <a:buChar char="»"/>
+              <a:defRPr sz="2000" kern="1200">
+                <a:solidFill>
+                  <a:schemeClr val="tx1"/>
+                </a:solidFill>
+                <a:latin typeface="+mn-lt"/>
+                <a:ea typeface="+mn-ea"/>
+                <a:cs typeface="+mn-cs"/>
+              </a:defRPr>
+            </a:lvl5pPr>
+            <a:lvl6pPr marL="2514600" indent="-228600" algn="l" defTabSz="457200" rtl="0" eaLnBrk="1" latinLnBrk="0" hangingPunct="1">
+              <a:spcBef>
+                <a:spcPct val="20000"/>
+              </a:spcBef>
+              <a:buFont typeface="Arial"/>
+              <a:buChar char="•"/>
+              <a:defRPr sz="2000" kern="1200">
+                <a:solidFill>
+                  <a:schemeClr val="tx1"/>
+                </a:solidFill>
+                <a:latin typeface="+mn-lt"/>
+                <a:ea typeface="+mn-ea"/>
+                <a:cs typeface="+mn-cs"/>
+              </a:defRPr>
+            </a:lvl6pPr>
+            <a:lvl7pPr marL="2971800" indent="-228600" algn="l" defTabSz="457200" rtl="0" eaLnBrk="1" latinLnBrk="0" hangingPunct="1">
+              <a:spcBef>
+                <a:spcPct val="20000"/>
+              </a:spcBef>
+              <a:buFont typeface="Arial"/>
+              <a:buChar char="•"/>
+              <a:defRPr sz="2000" kern="1200">
+                <a:solidFill>
+                  <a:schemeClr val="tx1"/>
+                </a:solidFill>
+                <a:latin typeface="+mn-lt"/>
+                <a:ea typeface="+mn-ea"/>
+                <a:cs typeface="+mn-cs"/>
+              </a:defRPr>
+            </a:lvl7pPr>
+            <a:lvl8pPr marL="3429000" indent="-228600" algn="l" defTabSz="457200" rtl="0" eaLnBrk="1" latinLnBrk="0" hangingPunct="1">
+              <a:spcBef>
+                <a:spcPct val="20000"/>
+              </a:spcBef>
+              <a:buFont typeface="Arial"/>
+              <a:buChar char="•"/>
+              <a:defRPr sz="2000" kern="1200">
+                <a:solidFill>
+                  <a:schemeClr val="tx1"/>
+                </a:solidFill>
+                <a:latin typeface="+mn-lt"/>
+                <a:ea typeface="+mn-ea"/>
+                <a:cs typeface="+mn-cs"/>
+              </a:defRPr>
+            </a:lvl8pPr>
+            <a:lvl9pPr marL="3886200" indent="-228600" algn="l" defTabSz="457200" rtl="0" eaLnBrk="1" latinLnBrk="0" hangingPunct="1">
+              <a:spcBef>
+                <a:spcPct val="20000"/>
+              </a:spcBef>
+              <a:buFont typeface="Arial"/>
+              <a:buChar char="•"/>
+              <a:defRPr sz="2000" kern="1200">
+                <a:solidFill>
+                  <a:schemeClr val="tx1"/>
+                </a:solidFill>
+                <a:latin typeface="+mn-lt"/>
+                <a:ea typeface="+mn-ea"/>
+                <a:cs typeface="+mn-cs"/>
+              </a:defRPr>
+            </a:lvl9pPr>
+          </a:lstStyle>
+          <a:p>
+            <a:pPr>
+              <a:defRPr/>
+            </a:pPr>
+            <a:r>
+              <a:rPr kumimoji="1" lang="en-US" altLang="zh-CN" sz="2800" noProof="0" dirty="0" smtClean="0">
+                <a:solidFill>
+                  <a:sysClr val="windowText" lastClr="000000"/>
+                </a:solidFill>
+                <a:latin typeface="Calibri"/>
+                <a:ea typeface="宋体" panose="02010600030101010101" pitchFamily="2" charset="-122"/>
+              </a:rPr>
+              <a:t>Find</a:t>
+            </a:r>
+            <a:r>
+              <a:rPr kumimoji="1" lang="zh-CN" altLang="en-US" sz="2800" noProof="0" dirty="0" smtClean="0">
+                <a:solidFill>
+                  <a:sysClr val="windowText" lastClr="000000"/>
+                </a:solidFill>
+                <a:latin typeface="Calibri"/>
+                <a:ea typeface="宋体" panose="02010600030101010101" pitchFamily="2" charset="-122"/>
+              </a:rPr>
+              <a:t> </a:t>
+            </a:r>
+            <a:r>
+              <a:rPr kumimoji="1" lang="en-US" altLang="zh-CN" sz="2800" dirty="0" smtClean="0">
+                <a:solidFill>
+                  <a:sysClr val="windowText" lastClr="000000"/>
+                </a:solidFill>
+                <a:latin typeface="Calibri"/>
+                <a:ea typeface="宋体" panose="02010600030101010101" pitchFamily="2" charset="-122"/>
+              </a:rPr>
+              <a:t>a</a:t>
+            </a:r>
+            <a:r>
+              <a:rPr kumimoji="1" lang="zh-CN" altLang="en-US" sz="2800" dirty="0" smtClean="0">
+                <a:solidFill>
+                  <a:sysClr val="windowText" lastClr="000000"/>
+                </a:solidFill>
+                <a:latin typeface="Calibri"/>
+                <a:ea typeface="宋体" panose="02010600030101010101" pitchFamily="2" charset="-122"/>
+              </a:rPr>
+              <a:t> </a:t>
+            </a:r>
+            <a:r>
+              <a:rPr kumimoji="1" lang="en-US" altLang="zh-CN" sz="2800" dirty="0" smtClean="0">
+                <a:solidFill>
+                  <a:sysClr val="windowText" lastClr="000000"/>
+                </a:solidFill>
+                <a:latin typeface="Calibri"/>
+                <a:ea typeface="宋体" panose="02010600030101010101" pitchFamily="2" charset="-122"/>
+              </a:rPr>
+              <a:t>way</a:t>
+            </a:r>
+            <a:r>
+              <a:rPr kumimoji="1" lang="zh-CN" altLang="en-US" sz="2800" dirty="0" smtClean="0">
+                <a:solidFill>
+                  <a:sysClr val="windowText" lastClr="000000"/>
+                </a:solidFill>
+                <a:latin typeface="Calibri"/>
+                <a:ea typeface="宋体" panose="02010600030101010101" pitchFamily="2" charset="-122"/>
+              </a:rPr>
+              <a:t> </a:t>
+            </a:r>
+            <a:r>
+              <a:rPr kumimoji="1" lang="en-US" altLang="zh-CN" sz="2800" dirty="0" smtClean="0">
+                <a:solidFill>
+                  <a:sysClr val="windowText" lastClr="000000"/>
+                </a:solidFill>
+                <a:latin typeface="Calibri"/>
+                <a:ea typeface="宋体" panose="02010600030101010101" pitchFamily="2" charset="-122"/>
+              </a:rPr>
+              <a:t>to</a:t>
+            </a:r>
+            <a:r>
+              <a:rPr kumimoji="1" lang="zh-CN" altLang="en-US" sz="2800" dirty="0" smtClean="0">
+                <a:solidFill>
+                  <a:sysClr val="windowText" lastClr="000000"/>
+                </a:solidFill>
+                <a:latin typeface="Calibri"/>
+                <a:ea typeface="宋体" panose="02010600030101010101" pitchFamily="2" charset="-122"/>
+              </a:rPr>
+              <a:t> </a:t>
+            </a:r>
+            <a:r>
+              <a:rPr kumimoji="1" lang="en-US" altLang="zh-CN" sz="2800" dirty="0">
+                <a:solidFill>
+                  <a:sysClr val="windowText" lastClr="000000"/>
+                </a:solidFill>
+                <a:latin typeface="Calibri"/>
+                <a:ea typeface="宋体" panose="02010600030101010101" pitchFamily="2" charset="-122"/>
+              </a:rPr>
+              <a:t>“</a:t>
+            </a:r>
+            <a:r>
+              <a:rPr kumimoji="1" lang="en-US" altLang="zh-CN" sz="2800" dirty="0" smtClean="0">
+                <a:solidFill>
+                  <a:sysClr val="windowText" lastClr="000000"/>
+                </a:solidFill>
+                <a:latin typeface="Calibri"/>
+                <a:ea typeface="宋体" panose="02010600030101010101" pitchFamily="2" charset="-122"/>
+              </a:rPr>
+              <a:t>quantization”</a:t>
+            </a:r>
+            <a:r>
+              <a:rPr kumimoji="1" lang="zh-CN" altLang="en-US" sz="2800" dirty="0" smtClean="0">
+                <a:solidFill>
+                  <a:sysClr val="windowText" lastClr="000000"/>
+                </a:solidFill>
+                <a:latin typeface="Calibri"/>
+                <a:ea typeface="宋体" panose="02010600030101010101" pitchFamily="2" charset="-122"/>
+              </a:rPr>
+              <a:t> </a:t>
+            </a:r>
+            <a:r>
+              <a:rPr kumimoji="1" lang="en-US" altLang="zh-CN" sz="2800" dirty="0" smtClean="0">
+                <a:solidFill>
+                  <a:sysClr val="windowText" lastClr="000000"/>
+                </a:solidFill>
+                <a:latin typeface="Calibri"/>
+                <a:ea typeface="宋体" panose="02010600030101010101" pitchFamily="2" charset="-122"/>
+              </a:rPr>
+              <a:t>each</a:t>
+            </a:r>
+            <a:r>
+              <a:rPr kumimoji="1" lang="zh-CN" altLang="en-US" sz="2800" dirty="0" smtClean="0">
+                <a:solidFill>
+                  <a:sysClr val="windowText" lastClr="000000"/>
+                </a:solidFill>
+                <a:latin typeface="Calibri"/>
+                <a:ea typeface="宋体" panose="02010600030101010101" pitchFamily="2" charset="-122"/>
+              </a:rPr>
+              <a:t> </a:t>
+            </a:r>
+            <a:r>
+              <a:rPr kumimoji="1" lang="en-US" altLang="zh-CN" sz="2800" dirty="0" smtClean="0">
+                <a:solidFill>
+                  <a:sysClr val="windowText" lastClr="000000"/>
+                </a:solidFill>
+                <a:latin typeface="Calibri"/>
+                <a:ea typeface="宋体" panose="02010600030101010101" pitchFamily="2" charset="-122"/>
+              </a:rPr>
+              <a:t>attribute</a:t>
+            </a:r>
+          </a:p>
+          <a:p>
+            <a:pPr lvl="1">
+              <a:defRPr/>
+            </a:pPr>
+            <a:r>
+              <a:rPr kumimoji="1" lang="en-US" altLang="zh-CN" sz="2400" b="0" i="0" u="none" strike="noStrike" kern="1200" cap="none" spc="0" normalizeH="0" baseline="0" noProof="0" dirty="0" smtClean="0">
+                <a:ln>
+                  <a:noFill/>
+                </a:ln>
+                <a:solidFill>
+                  <a:sysClr val="windowText" lastClr="000000"/>
+                </a:solidFill>
+                <a:effectLst/>
+                <a:uLnTx/>
+                <a:uFillTx/>
+                <a:latin typeface="Calibri"/>
+                <a:ea typeface="宋体" panose="02010600030101010101" pitchFamily="2" charset="-122"/>
+                <a:cs typeface="+mn-cs"/>
+              </a:rPr>
+              <a:t>T</a:t>
+            </a:r>
+            <a:r>
+              <a:rPr kumimoji="1" lang="en-US" altLang="zh-CN" sz="2400" dirty="0" smtClean="0">
+                <a:solidFill>
+                  <a:sysClr val="windowText" lastClr="000000"/>
+                </a:solidFill>
+                <a:latin typeface="Calibri"/>
+                <a:ea typeface="宋体" panose="02010600030101010101" pitchFamily="2" charset="-122"/>
+              </a:rPr>
+              <a:t>he</a:t>
+            </a:r>
+            <a:r>
+              <a:rPr kumimoji="1" lang="zh-CN" altLang="en-US" sz="2400" dirty="0" smtClean="0">
+                <a:solidFill>
+                  <a:sysClr val="windowText" lastClr="000000"/>
+                </a:solidFill>
+                <a:latin typeface="Calibri"/>
+                <a:ea typeface="宋体" panose="02010600030101010101" pitchFamily="2" charset="-122"/>
+              </a:rPr>
+              <a:t> </a:t>
+            </a:r>
+            <a:r>
+              <a:rPr kumimoji="1" lang="en-US" altLang="zh-CN" sz="2400" dirty="0" smtClean="0">
+                <a:solidFill>
+                  <a:sysClr val="windowText" lastClr="000000"/>
+                </a:solidFill>
+                <a:latin typeface="Calibri"/>
+                <a:ea typeface="宋体" panose="02010600030101010101" pitchFamily="2" charset="-122"/>
+              </a:rPr>
+              <a:t>attractiveness</a:t>
+            </a:r>
+            <a:r>
+              <a:rPr kumimoji="1" lang="zh-CN" altLang="en-US" sz="2400" dirty="0" smtClean="0">
+                <a:solidFill>
+                  <a:sysClr val="windowText" lastClr="000000"/>
+                </a:solidFill>
+                <a:latin typeface="Calibri"/>
+                <a:ea typeface="宋体" panose="02010600030101010101" pitchFamily="2" charset="-122"/>
+              </a:rPr>
+              <a:t> </a:t>
+            </a:r>
+            <a:r>
+              <a:rPr kumimoji="1" lang="en-US" altLang="zh-CN" sz="2400" dirty="0" smtClean="0">
+                <a:solidFill>
+                  <a:sysClr val="windowText" lastClr="000000"/>
+                </a:solidFill>
+                <a:latin typeface="Calibri"/>
+                <a:ea typeface="宋体" panose="02010600030101010101" pitchFamily="2" charset="-122"/>
+              </a:rPr>
+              <a:t>of</a:t>
+            </a:r>
+            <a:r>
+              <a:rPr kumimoji="1" lang="zh-CN" altLang="en-US" sz="2400" dirty="0" smtClean="0">
+                <a:solidFill>
+                  <a:sysClr val="windowText" lastClr="000000"/>
+                </a:solidFill>
+                <a:latin typeface="Calibri"/>
+                <a:ea typeface="宋体" panose="02010600030101010101" pitchFamily="2" charset="-122"/>
+              </a:rPr>
+              <a:t> </a:t>
+            </a:r>
+            <a:r>
+              <a:rPr kumimoji="1" lang="en-US" altLang="zh-CN" sz="2400" dirty="0" smtClean="0">
+                <a:solidFill>
+                  <a:sysClr val="windowText" lastClr="000000"/>
+                </a:solidFill>
+                <a:latin typeface="Calibri"/>
+                <a:ea typeface="宋体" panose="02010600030101010101" pitchFamily="2" charset="-122"/>
+              </a:rPr>
+              <a:t>each</a:t>
+            </a:r>
+            <a:r>
+              <a:rPr kumimoji="1" lang="zh-CN" altLang="en-US" sz="2400" dirty="0" smtClean="0">
+                <a:solidFill>
+                  <a:sysClr val="windowText" lastClr="000000"/>
+                </a:solidFill>
+                <a:latin typeface="Calibri"/>
+                <a:ea typeface="宋体" panose="02010600030101010101" pitchFamily="2" charset="-122"/>
+              </a:rPr>
+              <a:t> </a:t>
+            </a:r>
+            <a:r>
+              <a:rPr kumimoji="1" lang="en-US" altLang="zh-CN" sz="2400" dirty="0" smtClean="0">
+                <a:solidFill>
+                  <a:sysClr val="windowText" lastClr="000000"/>
+                </a:solidFill>
+                <a:latin typeface="Calibri"/>
+                <a:ea typeface="宋体" panose="02010600030101010101" pitchFamily="2" charset="-122"/>
+              </a:rPr>
+              <a:t>value</a:t>
+            </a:r>
+            <a:r>
+              <a:rPr kumimoji="1" lang="zh-CN" altLang="en-US" sz="2400" dirty="0" smtClean="0">
+                <a:solidFill>
+                  <a:sysClr val="windowText" lastClr="000000"/>
+                </a:solidFill>
+                <a:latin typeface="Calibri"/>
+                <a:ea typeface="宋体" panose="02010600030101010101" pitchFamily="2" charset="-122"/>
+              </a:rPr>
+              <a:t> </a:t>
+            </a:r>
+            <a:r>
+              <a:rPr kumimoji="1" lang="en-US" altLang="zh-CN" sz="2400" dirty="0" smtClean="0">
+                <a:solidFill>
+                  <a:sysClr val="windowText" lastClr="000000"/>
+                </a:solidFill>
+                <a:latin typeface="Calibri"/>
+                <a:ea typeface="宋体" panose="02010600030101010101" pitchFamily="2" charset="-122"/>
+              </a:rPr>
+              <a:t>is</a:t>
+            </a:r>
+            <a:r>
+              <a:rPr kumimoji="1" lang="zh-CN" altLang="en-US" sz="2400" dirty="0" smtClean="0">
+                <a:solidFill>
+                  <a:sysClr val="windowText" lastClr="000000"/>
+                </a:solidFill>
+                <a:latin typeface="Calibri"/>
+                <a:ea typeface="宋体" panose="02010600030101010101" pitchFamily="2" charset="-122"/>
+              </a:rPr>
+              <a:t> </a:t>
+            </a:r>
+            <a:r>
+              <a:rPr kumimoji="1" lang="en-US" altLang="zh-CN" sz="2400" dirty="0" smtClean="0">
+                <a:solidFill>
+                  <a:sysClr val="windowText" lastClr="000000"/>
+                </a:solidFill>
+                <a:latin typeface="Calibri"/>
+                <a:ea typeface="宋体" panose="02010600030101010101" pitchFamily="2" charset="-122"/>
+              </a:rPr>
+              <a:t>estimated</a:t>
+            </a:r>
+            <a:r>
+              <a:rPr kumimoji="1" lang="zh-CN" altLang="en-US" sz="2400" dirty="0" smtClean="0">
+                <a:solidFill>
+                  <a:sysClr val="windowText" lastClr="000000"/>
+                </a:solidFill>
+                <a:latin typeface="Calibri"/>
+                <a:ea typeface="宋体" panose="02010600030101010101" pitchFamily="2" charset="-122"/>
+              </a:rPr>
+              <a:t> </a:t>
+            </a:r>
+            <a:r>
+              <a:rPr kumimoji="1" lang="en-US" altLang="zh-CN" sz="2400" dirty="0" smtClean="0">
+                <a:solidFill>
+                  <a:sysClr val="windowText" lastClr="000000"/>
+                </a:solidFill>
+                <a:latin typeface="Calibri"/>
+                <a:ea typeface="宋体" panose="02010600030101010101" pitchFamily="2" charset="-122"/>
+              </a:rPr>
+              <a:t>by</a:t>
+            </a:r>
+            <a:r>
+              <a:rPr kumimoji="1" lang="zh-CN" altLang="en-US" sz="2400" dirty="0" smtClean="0">
+                <a:solidFill>
+                  <a:sysClr val="windowText" lastClr="000000"/>
+                </a:solidFill>
+                <a:latin typeface="Calibri"/>
+                <a:ea typeface="宋体" panose="02010600030101010101" pitchFamily="2" charset="-122"/>
+              </a:rPr>
+              <a:t> </a:t>
+            </a:r>
+            <a:r>
+              <a:rPr kumimoji="1" lang="en-US" altLang="zh-CN" sz="2400" dirty="0" smtClean="0">
+                <a:solidFill>
+                  <a:sysClr val="windowText" lastClr="000000"/>
+                </a:solidFill>
+                <a:latin typeface="Calibri"/>
+                <a:ea typeface="宋体" panose="02010600030101010101" pitchFamily="2" charset="-122"/>
+              </a:rPr>
+              <a:t>the</a:t>
+            </a:r>
+            <a:r>
+              <a:rPr kumimoji="1" lang="zh-CN" altLang="en-US" sz="2400" dirty="0" smtClean="0">
+                <a:solidFill>
+                  <a:sysClr val="windowText" lastClr="000000"/>
+                </a:solidFill>
+                <a:latin typeface="Calibri"/>
+                <a:ea typeface="宋体" panose="02010600030101010101" pitchFamily="2" charset="-122"/>
+              </a:rPr>
+              <a:t> </a:t>
+            </a:r>
+            <a:r>
+              <a:rPr kumimoji="1" lang="en-US" altLang="zh-CN" sz="2400" dirty="0" smtClean="0">
+                <a:solidFill>
+                  <a:sysClr val="windowText" lastClr="000000"/>
+                </a:solidFill>
+                <a:latin typeface="Calibri"/>
+                <a:ea typeface="宋体" panose="02010600030101010101" pitchFamily="2" charset="-122"/>
+              </a:rPr>
+              <a:t>click</a:t>
+            </a:r>
+            <a:r>
+              <a:rPr kumimoji="1" lang="zh-CN" altLang="en-US" sz="2400" dirty="0" smtClean="0">
+                <a:solidFill>
+                  <a:sysClr val="windowText" lastClr="000000"/>
+                </a:solidFill>
+                <a:latin typeface="Calibri"/>
+                <a:ea typeface="宋体" panose="02010600030101010101" pitchFamily="2" charset="-122"/>
+              </a:rPr>
+              <a:t> </a:t>
+            </a:r>
+            <a:r>
+              <a:rPr kumimoji="1" lang="en-US" altLang="zh-CN" sz="2400" dirty="0" smtClean="0">
+                <a:solidFill>
+                  <a:sysClr val="windowText" lastClr="000000"/>
+                </a:solidFill>
+                <a:latin typeface="Calibri"/>
+                <a:ea typeface="宋体" panose="02010600030101010101" pitchFamily="2" charset="-122"/>
+              </a:rPr>
+              <a:t>rate</a:t>
+            </a:r>
+          </a:p>
+          <a:p>
+            <a:pPr lvl="1">
+              <a:defRPr/>
+            </a:pPr>
+            <a:r>
+              <a:rPr kumimoji="1" lang="en-US" altLang="zh-CN" sz="2400" b="0" i="0" u="none" strike="noStrike" kern="1200" cap="none" spc="0" normalizeH="0" baseline="0" noProof="0" dirty="0" smtClean="0">
+                <a:ln>
+                  <a:noFill/>
+                </a:ln>
+                <a:solidFill>
+                  <a:sysClr val="windowText" lastClr="000000"/>
+                </a:solidFill>
+                <a:effectLst/>
+                <a:uLnTx/>
+                <a:uFillTx/>
+                <a:latin typeface="Calibri"/>
+                <a:ea typeface="宋体" panose="02010600030101010101" pitchFamily="2" charset="-122"/>
+                <a:cs typeface="+mn-cs"/>
+              </a:rPr>
+              <a:t>Use</a:t>
+            </a:r>
+            <a:r>
+              <a:rPr kumimoji="1" lang="zh-CN" altLang="en-US" sz="2400" b="0" i="0" u="none" strike="noStrike" kern="1200" cap="none" spc="0" normalizeH="0" baseline="0" noProof="0" dirty="0" smtClean="0">
+                <a:ln>
+                  <a:noFill/>
+                </a:ln>
+                <a:solidFill>
+                  <a:sysClr val="windowText" lastClr="000000"/>
+                </a:solidFill>
+                <a:effectLst/>
+                <a:uLnTx/>
+                <a:uFillTx/>
+                <a:latin typeface="Calibri"/>
+                <a:ea typeface="宋体" panose="02010600030101010101" pitchFamily="2" charset="-122"/>
+                <a:cs typeface="+mn-cs"/>
+              </a:rPr>
+              <a:t> </a:t>
+            </a:r>
+            <a:r>
+              <a:rPr kumimoji="1" lang="en-US" altLang="zh-CN" sz="2400" b="0" i="0" u="none" strike="noStrike" kern="1200" cap="none" spc="0" normalizeH="0" baseline="0" noProof="0" dirty="0" smtClean="0">
+                <a:ln>
+                  <a:noFill/>
+                </a:ln>
+                <a:solidFill>
+                  <a:sysClr val="windowText" lastClr="000000"/>
+                </a:solidFill>
+                <a:effectLst/>
+                <a:uLnTx/>
+                <a:uFillTx/>
+                <a:latin typeface="Calibri"/>
+                <a:ea typeface="宋体" panose="02010600030101010101" pitchFamily="2" charset="-122"/>
+                <a:cs typeface="+mn-cs"/>
+              </a:rPr>
+              <a:t>Gaussian</a:t>
+            </a:r>
+            <a:r>
+              <a:rPr kumimoji="1" lang="zh-CN" altLang="en-US" sz="2400" b="0" i="0" u="none" strike="noStrike" kern="1200" cap="none" spc="0" normalizeH="0" baseline="0" noProof="0" dirty="0" smtClean="0">
+                <a:ln>
+                  <a:noFill/>
+                </a:ln>
+                <a:solidFill>
+                  <a:sysClr val="windowText" lastClr="000000"/>
+                </a:solidFill>
+                <a:effectLst/>
+                <a:uLnTx/>
+                <a:uFillTx/>
+                <a:latin typeface="Calibri"/>
+                <a:ea typeface="宋体" panose="02010600030101010101" pitchFamily="2" charset="-122"/>
+                <a:cs typeface="+mn-cs"/>
+              </a:rPr>
+              <a:t> </a:t>
+            </a:r>
+            <a:r>
+              <a:rPr kumimoji="1" lang="en-US" altLang="zh-CN" sz="2400" b="0" i="0" u="none" strike="noStrike" kern="1200" cap="none" spc="0" normalizeH="0" baseline="0" noProof="0" dirty="0" smtClean="0">
+                <a:ln>
+                  <a:noFill/>
+                </a:ln>
+                <a:solidFill>
+                  <a:sysClr val="windowText" lastClr="000000"/>
+                </a:solidFill>
+                <a:effectLst/>
+                <a:uLnTx/>
+                <a:uFillTx/>
+                <a:latin typeface="Calibri"/>
+                <a:ea typeface="宋体" panose="02010600030101010101" pitchFamily="2" charset="-122"/>
+                <a:cs typeface="+mn-cs"/>
+              </a:rPr>
+              <a:t>Naïve</a:t>
+            </a:r>
+            <a:r>
+              <a:rPr kumimoji="1" lang="zh-CN" altLang="en-US" sz="2400" b="0" i="0" u="none" strike="noStrike" kern="1200" cap="none" spc="0" normalizeH="0" baseline="0" noProof="0" dirty="0" smtClean="0">
+                <a:ln>
+                  <a:noFill/>
+                </a:ln>
+                <a:solidFill>
+                  <a:sysClr val="windowText" lastClr="000000"/>
+                </a:solidFill>
+                <a:effectLst/>
+                <a:uLnTx/>
+                <a:uFillTx/>
+                <a:latin typeface="Calibri"/>
+                <a:ea typeface="宋体" panose="02010600030101010101" pitchFamily="2" charset="-122"/>
+                <a:cs typeface="+mn-cs"/>
+              </a:rPr>
+              <a:t> </a:t>
+            </a:r>
+            <a:r>
+              <a:rPr kumimoji="1" lang="en-US" altLang="zh-CN" sz="2400" b="0" i="0" u="none" strike="noStrike" kern="1200" cap="none" spc="0" normalizeH="0" baseline="0" noProof="0" dirty="0" smtClean="0">
+                <a:ln>
+                  <a:noFill/>
+                </a:ln>
+                <a:solidFill>
+                  <a:sysClr val="windowText" lastClr="000000"/>
+                </a:solidFill>
+                <a:effectLst/>
+                <a:uLnTx/>
+                <a:uFillTx/>
+                <a:latin typeface="Calibri"/>
+                <a:ea typeface="宋体" panose="02010600030101010101" pitchFamily="2" charset="-122"/>
+                <a:cs typeface="+mn-cs"/>
+              </a:rPr>
+              <a:t>Bayes</a:t>
+            </a:r>
+            <a:r>
+              <a:rPr kumimoji="1" lang="zh-CN" altLang="en-US" sz="2400" b="0" i="0" u="none" strike="noStrike" kern="1200" cap="none" spc="0" normalizeH="0" baseline="0" noProof="0" dirty="0" smtClean="0">
+                <a:ln>
+                  <a:noFill/>
+                </a:ln>
+                <a:solidFill>
+                  <a:sysClr val="windowText" lastClr="000000"/>
+                </a:solidFill>
+                <a:effectLst/>
+                <a:uLnTx/>
+                <a:uFillTx/>
+                <a:latin typeface="Calibri"/>
+                <a:ea typeface="宋体" panose="02010600030101010101" pitchFamily="2" charset="-122"/>
+                <a:cs typeface="+mn-cs"/>
+              </a:rPr>
+              <a:t> </a:t>
+            </a:r>
+            <a:r>
+              <a:rPr kumimoji="1" lang="en-US" altLang="zh-CN" sz="2400" b="0" i="0" u="none" strike="noStrike" kern="1200" cap="none" spc="0" normalizeH="0" baseline="0" noProof="0" dirty="0" smtClean="0">
+                <a:ln>
+                  <a:noFill/>
+                </a:ln>
+                <a:solidFill>
+                  <a:sysClr val="windowText" lastClr="000000"/>
+                </a:solidFill>
+                <a:effectLst/>
+                <a:uLnTx/>
+                <a:uFillTx/>
+                <a:latin typeface="Calibri"/>
+                <a:ea typeface="宋体" panose="02010600030101010101" pitchFamily="2" charset="-122"/>
+                <a:cs typeface="+mn-cs"/>
+              </a:rPr>
+              <a:t>to</a:t>
+            </a:r>
+            <a:r>
+              <a:rPr kumimoji="1" lang="zh-CN" altLang="en-US" sz="2400" b="0" i="0" u="none" strike="noStrike" kern="1200" cap="none" spc="0" normalizeH="0" baseline="0" noProof="0" dirty="0" smtClean="0">
+                <a:ln>
+                  <a:noFill/>
+                </a:ln>
+                <a:solidFill>
+                  <a:sysClr val="windowText" lastClr="000000"/>
+                </a:solidFill>
+                <a:effectLst/>
+                <a:uLnTx/>
+                <a:uFillTx/>
+                <a:latin typeface="Calibri"/>
+                <a:ea typeface="宋体" panose="02010600030101010101" pitchFamily="2" charset="-122"/>
+                <a:cs typeface="+mn-cs"/>
+              </a:rPr>
+              <a:t> </a:t>
+            </a:r>
+            <a:r>
+              <a:rPr kumimoji="1" lang="en-US" altLang="zh-CN" sz="2400" dirty="0" smtClean="0">
+                <a:solidFill>
+                  <a:sysClr val="windowText" lastClr="000000"/>
+                </a:solidFill>
+                <a:latin typeface="Calibri"/>
+                <a:ea typeface="宋体" panose="02010600030101010101" pitchFamily="2" charset="-122"/>
+              </a:rPr>
+              <a:t>predict</a:t>
+            </a:r>
+            <a:r>
+              <a:rPr kumimoji="1" lang="zh-CN" altLang="en-US" sz="2400" dirty="0" smtClean="0">
+                <a:solidFill>
+                  <a:sysClr val="windowText" lastClr="000000"/>
+                </a:solidFill>
+                <a:latin typeface="Calibri"/>
+                <a:ea typeface="宋体" panose="02010600030101010101" pitchFamily="2" charset="-122"/>
+              </a:rPr>
+              <a:t> </a:t>
+            </a:r>
+            <a:r>
+              <a:rPr kumimoji="1" lang="en-US" altLang="zh-CN" sz="2400" dirty="0" smtClean="0">
+                <a:solidFill>
+                  <a:sysClr val="windowText" lastClr="000000"/>
+                </a:solidFill>
+                <a:latin typeface="Calibri"/>
+                <a:ea typeface="宋体" panose="02010600030101010101" pitchFamily="2" charset="-122"/>
+              </a:rPr>
+              <a:t>the</a:t>
+            </a:r>
+            <a:r>
+              <a:rPr kumimoji="1" lang="zh-CN" altLang="en-US" sz="2400" dirty="0" smtClean="0">
+                <a:solidFill>
+                  <a:sysClr val="windowText" lastClr="000000"/>
+                </a:solidFill>
+                <a:latin typeface="Calibri"/>
+                <a:ea typeface="宋体" panose="02010600030101010101" pitchFamily="2" charset="-122"/>
+              </a:rPr>
+              <a:t> </a:t>
+            </a:r>
+            <a:r>
+              <a:rPr kumimoji="1" lang="en-US" altLang="zh-CN" sz="2400" dirty="0" smtClean="0">
+                <a:solidFill>
+                  <a:sysClr val="windowText" lastClr="000000"/>
+                </a:solidFill>
+                <a:latin typeface="Calibri"/>
+                <a:ea typeface="宋体" panose="02010600030101010101" pitchFamily="2" charset="-122"/>
+              </a:rPr>
+              <a:t>overall</a:t>
+            </a:r>
+            <a:r>
+              <a:rPr kumimoji="1" lang="zh-CN" altLang="en-US" sz="2400" dirty="0" smtClean="0">
+                <a:solidFill>
+                  <a:sysClr val="windowText" lastClr="000000"/>
+                </a:solidFill>
+                <a:latin typeface="Calibri"/>
+                <a:ea typeface="宋体" panose="02010600030101010101" pitchFamily="2" charset="-122"/>
+              </a:rPr>
+              <a:t> </a:t>
+            </a:r>
+            <a:r>
+              <a:rPr kumimoji="1" lang="en-US" altLang="zh-CN" sz="2400" dirty="0" smtClean="0">
+                <a:solidFill>
+                  <a:sysClr val="windowText" lastClr="000000"/>
+                </a:solidFill>
+                <a:latin typeface="Calibri"/>
+                <a:ea typeface="宋体" panose="02010600030101010101" pitchFamily="2" charset="-122"/>
+              </a:rPr>
+              <a:t>click</a:t>
+            </a:r>
+            <a:r>
+              <a:rPr kumimoji="1" lang="zh-CN" altLang="en-US" sz="2400" dirty="0" smtClean="0">
+                <a:solidFill>
+                  <a:sysClr val="windowText" lastClr="000000"/>
+                </a:solidFill>
+                <a:latin typeface="Calibri"/>
+                <a:ea typeface="宋体" panose="02010600030101010101" pitchFamily="2" charset="-122"/>
+              </a:rPr>
+              <a:t> </a:t>
+            </a:r>
+            <a:r>
+              <a:rPr kumimoji="1" lang="en-US" altLang="zh-CN" sz="2400" dirty="0" smtClean="0">
+                <a:solidFill>
+                  <a:sysClr val="windowText" lastClr="000000"/>
+                </a:solidFill>
+                <a:latin typeface="Calibri"/>
+                <a:ea typeface="宋体" panose="02010600030101010101" pitchFamily="2" charset="-122"/>
+              </a:rPr>
+              <a:t>rate</a:t>
+            </a:r>
+          </a:p>
+          <a:p>
+            <a:pPr lvl="1">
+              <a:defRPr/>
+            </a:pPr>
+            <a:r>
+              <a:rPr kumimoji="1" lang="en-US" altLang="zh-CN" sz="2400" b="0" i="0" u="none" strike="noStrike" kern="1200" cap="none" spc="0" normalizeH="0" baseline="0" noProof="0" dirty="0" smtClean="0">
+                <a:ln>
+                  <a:noFill/>
+                </a:ln>
+                <a:solidFill>
+                  <a:sysClr val="windowText" lastClr="000000"/>
+                </a:solidFill>
+                <a:effectLst/>
+                <a:uLnTx/>
+                <a:uFillTx/>
+                <a:latin typeface="Calibri"/>
+                <a:ea typeface="宋体" panose="02010600030101010101" pitchFamily="2" charset="-122"/>
+                <a:cs typeface="+mn-cs"/>
+              </a:rPr>
+              <a:t>During</a:t>
+            </a:r>
+            <a:r>
+              <a:rPr kumimoji="1" lang="zh-CN" altLang="en-US" sz="2400" b="0" i="0" u="none" strike="noStrike" kern="1200" cap="none" spc="0" normalizeH="0" baseline="0" noProof="0" dirty="0" smtClean="0">
+                <a:ln>
+                  <a:noFill/>
+                </a:ln>
+                <a:solidFill>
+                  <a:sysClr val="windowText" lastClr="000000"/>
+                </a:solidFill>
+                <a:effectLst/>
+                <a:uLnTx/>
+                <a:uFillTx/>
+                <a:latin typeface="Calibri"/>
+                <a:ea typeface="宋体" panose="02010600030101010101" pitchFamily="2" charset="-122"/>
+                <a:cs typeface="+mn-cs"/>
+              </a:rPr>
+              <a:t> </a:t>
+            </a:r>
+            <a:r>
+              <a:rPr kumimoji="1" lang="en-US" altLang="zh-CN" sz="2400" b="0" i="0" u="none" strike="noStrike" kern="1200" cap="none" spc="0" normalizeH="0" baseline="0" noProof="0" dirty="0" smtClean="0">
+                <a:ln>
+                  <a:noFill/>
+                </a:ln>
+                <a:solidFill>
+                  <a:sysClr val="windowText" lastClr="000000"/>
+                </a:solidFill>
+                <a:effectLst/>
+                <a:uLnTx/>
+                <a:uFillTx/>
+                <a:latin typeface="Calibri"/>
+                <a:ea typeface="宋体" panose="02010600030101010101" pitchFamily="2" charset="-122"/>
+                <a:cs typeface="+mn-cs"/>
+              </a:rPr>
+              <a:t>testing,</a:t>
+            </a:r>
+            <a:r>
+              <a:rPr kumimoji="1" lang="zh-CN" altLang="en-US" sz="2400" b="0" i="0" u="none" strike="noStrike" kern="1200" cap="none" spc="0" normalizeH="0" baseline="0" noProof="0" dirty="0" smtClean="0">
+                <a:ln>
+                  <a:noFill/>
+                </a:ln>
+                <a:solidFill>
+                  <a:sysClr val="windowText" lastClr="000000"/>
+                </a:solidFill>
+                <a:effectLst/>
+                <a:uLnTx/>
+                <a:uFillTx/>
+                <a:latin typeface="Calibri"/>
+                <a:ea typeface="宋体" panose="02010600030101010101" pitchFamily="2" charset="-122"/>
+                <a:cs typeface="+mn-cs"/>
+              </a:rPr>
+              <a:t> </a:t>
+            </a:r>
+            <a:r>
+              <a:rPr kumimoji="1" lang="en-US" altLang="zh-CN" sz="2400" b="0" i="0" u="none" strike="noStrike" kern="1200" cap="none" spc="0" normalizeH="0" baseline="0" noProof="0" dirty="0" smtClean="0">
+                <a:ln>
+                  <a:noFill/>
+                </a:ln>
+                <a:solidFill>
+                  <a:sysClr val="windowText" lastClr="000000"/>
+                </a:solidFill>
+                <a:effectLst/>
+                <a:uLnTx/>
+                <a:uFillTx/>
+                <a:latin typeface="Calibri"/>
+                <a:ea typeface="宋体" panose="02010600030101010101" pitchFamily="2" charset="-122"/>
+                <a:cs typeface="+mn-cs"/>
+              </a:rPr>
+              <a:t>use</a:t>
+            </a:r>
+            <a:r>
+              <a:rPr kumimoji="1" lang="zh-CN" altLang="en-US" sz="2400" b="0" i="0" u="none" strike="noStrike" kern="1200" cap="none" spc="0" normalizeH="0" baseline="0" noProof="0" dirty="0" smtClean="0">
+                <a:ln>
+                  <a:noFill/>
+                </a:ln>
+                <a:solidFill>
+                  <a:sysClr val="windowText" lastClr="000000"/>
+                </a:solidFill>
+                <a:effectLst/>
+                <a:uLnTx/>
+                <a:uFillTx/>
+                <a:latin typeface="Calibri"/>
+                <a:ea typeface="宋体" panose="02010600030101010101" pitchFamily="2" charset="-122"/>
+                <a:cs typeface="+mn-cs"/>
+              </a:rPr>
+              <a:t> </a:t>
+            </a:r>
+            <a:r>
+              <a:rPr kumimoji="1" lang="en-US" altLang="zh-CN" sz="2400" b="0" i="0" u="none" strike="noStrike" kern="1200" cap="none" spc="0" normalizeH="0" baseline="0" noProof="0" dirty="0" smtClean="0">
+                <a:ln>
+                  <a:noFill/>
+                </a:ln>
+                <a:solidFill>
+                  <a:sysClr val="windowText" lastClr="000000"/>
+                </a:solidFill>
+                <a:effectLst/>
+                <a:uLnTx/>
+                <a:uFillTx/>
+                <a:latin typeface="Calibri"/>
+                <a:ea typeface="宋体" panose="02010600030101010101" pitchFamily="2" charset="-122"/>
+                <a:cs typeface="+mn-cs"/>
+              </a:rPr>
+              <a:t>a</a:t>
+            </a:r>
+            <a:r>
+              <a:rPr kumimoji="1" lang="zh-CN" altLang="en-US" sz="2400" b="0" i="0" u="none" strike="noStrike" kern="1200" cap="none" spc="0" normalizeH="0" baseline="0" noProof="0" dirty="0" smtClean="0">
+                <a:ln>
+                  <a:noFill/>
+                </a:ln>
+                <a:solidFill>
+                  <a:sysClr val="windowText" lastClr="000000"/>
+                </a:solidFill>
+                <a:effectLst/>
+                <a:uLnTx/>
+                <a:uFillTx/>
+                <a:latin typeface="Calibri"/>
+                <a:ea typeface="宋体" panose="02010600030101010101" pitchFamily="2" charset="-122"/>
+                <a:cs typeface="+mn-cs"/>
+              </a:rPr>
+              <a:t> </a:t>
+            </a:r>
+            <a:r>
+              <a:rPr kumimoji="1" lang="en-US" altLang="zh-CN" sz="2400" b="0" i="0" u="none" strike="noStrike" kern="1200" cap="none" spc="0" normalizeH="0" baseline="0" noProof="0" dirty="0" smtClean="0">
+                <a:ln>
+                  <a:noFill/>
+                </a:ln>
+                <a:solidFill>
+                  <a:sysClr val="windowText" lastClr="000000"/>
+                </a:solidFill>
+                <a:effectLst/>
+                <a:uLnTx/>
+                <a:uFillTx/>
+                <a:latin typeface="Calibri"/>
+                <a:ea typeface="宋体" panose="02010600030101010101" pitchFamily="2" charset="-122"/>
+                <a:cs typeface="+mn-cs"/>
+              </a:rPr>
+              <a:t>process</a:t>
+            </a:r>
+            <a:r>
+              <a:rPr kumimoji="1" lang="zh-CN" altLang="en-US" sz="2400" b="0" i="0" u="none" strike="noStrike" kern="1200" cap="none" spc="0" normalizeH="0" baseline="0" noProof="0" dirty="0" smtClean="0">
+                <a:ln>
+                  <a:noFill/>
+                </a:ln>
+                <a:solidFill>
+                  <a:sysClr val="windowText" lastClr="000000"/>
+                </a:solidFill>
+                <a:effectLst/>
+                <a:uLnTx/>
+                <a:uFillTx/>
+                <a:latin typeface="Calibri"/>
+                <a:ea typeface="宋体" panose="02010600030101010101" pitchFamily="2" charset="-122"/>
+                <a:cs typeface="+mn-cs"/>
+              </a:rPr>
+              <a:t> </a:t>
+            </a:r>
+            <a:r>
+              <a:rPr kumimoji="1" lang="en-US" altLang="zh-CN" sz="2400" b="0" i="0" u="none" strike="noStrike" kern="1200" cap="none" spc="0" normalizeH="0" baseline="0" noProof="0" dirty="0" smtClean="0">
+                <a:ln>
+                  <a:noFill/>
+                </a:ln>
+                <a:solidFill>
+                  <a:sysClr val="windowText" lastClr="000000"/>
+                </a:solidFill>
+                <a:effectLst/>
+                <a:uLnTx/>
+                <a:uFillTx/>
+                <a:latin typeface="Calibri"/>
+                <a:ea typeface="宋体" panose="02010600030101010101" pitchFamily="2" charset="-122"/>
+                <a:cs typeface="+mn-cs"/>
+              </a:rPr>
+              <a:t>similar</a:t>
+            </a:r>
+            <a:r>
+              <a:rPr kumimoji="1" lang="zh-CN" altLang="en-US" sz="2400" b="0" i="0" u="none" strike="noStrike" kern="1200" cap="none" spc="0" normalizeH="0" baseline="0" noProof="0" dirty="0" smtClean="0">
+                <a:ln>
+                  <a:noFill/>
+                </a:ln>
+                <a:solidFill>
+                  <a:sysClr val="windowText" lastClr="000000"/>
+                </a:solidFill>
+                <a:effectLst/>
+                <a:uLnTx/>
+                <a:uFillTx/>
+                <a:latin typeface="Calibri"/>
+                <a:ea typeface="宋体" panose="02010600030101010101" pitchFamily="2" charset="-122"/>
+                <a:cs typeface="+mn-cs"/>
+              </a:rPr>
+              <a:t> </a:t>
+            </a:r>
+            <a:r>
+              <a:rPr kumimoji="1" lang="en-US" altLang="zh-CN" sz="2400" b="0" i="0" u="none" strike="noStrike" kern="1200" cap="none" spc="0" normalizeH="0" baseline="0" noProof="0" dirty="0" smtClean="0">
+                <a:ln>
+                  <a:noFill/>
+                </a:ln>
+                <a:solidFill>
+                  <a:sysClr val="windowText" lastClr="000000"/>
+                </a:solidFill>
+                <a:effectLst/>
+                <a:uLnTx/>
+                <a:uFillTx/>
+                <a:latin typeface="Calibri"/>
+                <a:ea typeface="宋体" panose="02010600030101010101" pitchFamily="2" charset="-122"/>
+                <a:cs typeface="+mn-cs"/>
+              </a:rPr>
+              <a:t>to</a:t>
+            </a:r>
+            <a:r>
+              <a:rPr kumimoji="1" lang="zh-CN" altLang="en-US" sz="2400" b="0" i="0" u="none" strike="noStrike" kern="1200" cap="none" spc="0" normalizeH="0" baseline="0" noProof="0" dirty="0" smtClean="0">
+                <a:ln>
+                  <a:noFill/>
+                </a:ln>
+                <a:solidFill>
+                  <a:sysClr val="windowText" lastClr="000000"/>
+                </a:solidFill>
+                <a:effectLst/>
+                <a:uLnTx/>
+                <a:uFillTx/>
+                <a:latin typeface="Calibri"/>
+                <a:ea typeface="宋体" panose="02010600030101010101" pitchFamily="2" charset="-122"/>
+                <a:cs typeface="+mn-cs"/>
+              </a:rPr>
+              <a:t> </a:t>
+            </a:r>
+            <a:r>
+              <a:rPr kumimoji="1" lang="en-US" altLang="zh-CN" sz="2400" b="0" i="0" u="none" strike="noStrike" kern="1200" cap="none" spc="0" normalizeH="0" baseline="0" noProof="0" dirty="0" smtClean="0">
+                <a:ln>
+                  <a:noFill/>
+                </a:ln>
+                <a:solidFill>
+                  <a:sysClr val="windowText" lastClr="000000"/>
+                </a:solidFill>
+                <a:effectLst/>
+                <a:uLnTx/>
+                <a:uFillTx/>
+                <a:latin typeface="Calibri"/>
+                <a:ea typeface="宋体" panose="02010600030101010101" pitchFamily="2" charset="-122"/>
+                <a:cs typeface="+mn-cs"/>
+              </a:rPr>
+              <a:t>EM</a:t>
+            </a:r>
+            <a:r>
+              <a:rPr kumimoji="1" lang="zh-CN" altLang="en-US" sz="2400" b="0" i="0" u="none" strike="noStrike" kern="1200" cap="none" spc="0" normalizeH="0" baseline="0" noProof="0" dirty="0" smtClean="0">
+                <a:ln>
+                  <a:noFill/>
+                </a:ln>
+                <a:solidFill>
+                  <a:sysClr val="windowText" lastClr="000000"/>
+                </a:solidFill>
+                <a:effectLst/>
+                <a:uLnTx/>
+                <a:uFillTx/>
+                <a:latin typeface="Calibri"/>
+                <a:ea typeface="宋体" panose="02010600030101010101" pitchFamily="2" charset="-122"/>
+                <a:cs typeface="+mn-cs"/>
+              </a:rPr>
+              <a:t> </a:t>
+            </a:r>
+            <a:r>
+              <a:rPr kumimoji="1" lang="en-US" altLang="zh-CN" sz="2400" b="0" i="0" u="none" strike="noStrike" kern="1200" cap="none" spc="0" normalizeH="0" baseline="0" noProof="0" dirty="0" smtClean="0">
+                <a:ln>
+                  <a:noFill/>
+                </a:ln>
+                <a:solidFill>
+                  <a:sysClr val="windowText" lastClr="000000"/>
+                </a:solidFill>
+                <a:effectLst/>
+                <a:uLnTx/>
+                <a:uFillTx/>
+                <a:latin typeface="Calibri"/>
+                <a:ea typeface="宋体" panose="02010600030101010101" pitchFamily="2" charset="-122"/>
+                <a:cs typeface="+mn-cs"/>
+              </a:rPr>
+              <a:t>algorithm</a:t>
+            </a:r>
+          </a:p>
+          <a:p>
+            <a:pPr lvl="2">
+              <a:defRPr/>
+            </a:pPr>
+            <a:endParaRPr kumimoji="1" lang="en-US" altLang="zh-CN" sz="2000" b="0" i="0" u="none" strike="noStrike" kern="1200" cap="none" spc="0" normalizeH="0" baseline="0" noProof="0" dirty="0" smtClean="0">
+              <a:ln>
+                <a:noFill/>
+              </a:ln>
+              <a:solidFill>
+                <a:sysClr val="windowText" lastClr="000000"/>
+              </a:solidFill>
+              <a:effectLst/>
+              <a:uLnTx/>
+              <a:uFillTx/>
+              <a:latin typeface="Calibri"/>
+              <a:ea typeface="宋体" panose="02010600030101010101" pitchFamily="2" charset="-122"/>
+              <a:cs typeface="+mn-cs"/>
+            </a:endParaRPr>
+          </a:p>
+        </p:txBody>
+      </p:sp>
+      <p:sp>
+        <p:nvSpPr>
+          <p:cNvPr id="2" name="标题 1"/>
+          <p:cNvSpPr>
+            <a:spLocks noGrp="1"/>
+          </p:cNvSpPr>
+          <p:nvPr>
+            <p:ph type="title"/>
+          </p:nvPr>
+        </p:nvSpPr>
+        <p:spPr/>
+        <p:txBody>
+          <a:bodyPr/>
+          <a:lstStyle/>
+          <a:p>
+            <a:r>
+              <a:rPr kumimoji="1" lang="en-US" altLang="zh-CN" dirty="0" smtClean="0"/>
+              <a:t>Naïve Bayesian</a:t>
+            </a:r>
+            <a:endParaRPr kumimoji="1" lang="zh-CN" altLang="en-US" dirty="0"/>
+          </a:p>
+        </p:txBody>
+      </p:sp>
+    </p:spTree>
+    <p:extLst>
+      <p:ext uri="{BB962C8B-B14F-4D97-AF65-F5344CB8AC3E}">
+        <p14:creationId xmlns:p14="http://schemas.microsoft.com/office/powerpoint/2010/main" val="3006266951"/>
+      </p:ext>
+    </p:extLst>
+  </p:cSld>
+  <p:clrMapOvr>
+    <a:masterClrMapping/>
+  </p:clrMapOvr>
+</p:sld>
+</file>
+
+<file path=ppt/slides/slide13.xml><?xml version="1.0" encoding="utf-8"?>
 <p:sld xmlns:a="http://schemas.openxmlformats.org/drawingml/2006/main" xmlns:r="http://schemas.openxmlformats.org/officeDocument/2006/relationships" xmlns:p="http://schemas.openxmlformats.org/presentationml/2006/main">
   <p:cSld>
     <p:spTree>
@@ -6573,14 +7714,14 @@
   <p:timing>
     <p:tnLst>
       <p:par>
-        <p:cTn id="1" dur="indefinite" restart="never" nodeType="tmRoot"/>
+        <p:cTn xmlns:p14="http://schemas.microsoft.com/office/powerpoint/2010/main" id="1" dur="indefinite" restart="never" nodeType="tmRoot"/>
       </p:par>
     </p:tnLst>
   </p:timing>
 </p:sld>
 </file>
 
-<file path=ppt/slides/slide13.xml><?xml version="1.0" encoding="utf-8"?>
+<file path=ppt/slides/slide14.xml><?xml version="1.0" encoding="utf-8"?>
 <p:sld xmlns:a="http://schemas.openxmlformats.org/drawingml/2006/main" xmlns:r="http://schemas.openxmlformats.org/officeDocument/2006/relationships" xmlns:p="http://schemas.openxmlformats.org/presentationml/2006/main">
   <p:cSld>
     <p:spTree>
@@ -7056,7 +8197,7 @@
 </p:sld>
 </file>
 
-<file path=ppt/slides/slide14.xml><?xml version="1.0" encoding="utf-8"?>
+<file path=ppt/slides/slide15.xml><?xml version="1.0" encoding="utf-8"?>
 <p:sld xmlns:a="http://schemas.openxmlformats.org/drawingml/2006/main" xmlns:r="http://schemas.openxmlformats.org/officeDocument/2006/relationships" xmlns:p="http://schemas.openxmlformats.org/presentationml/2006/main">
   <p:cSld>
     <p:spTree>
@@ -8118,14 +9259,14 @@
   <p:timing>
     <p:tnLst>
       <p:par>
-        <p:cTn id="1" dur="indefinite" restart="never" nodeType="tmRoot"/>
+        <p:cTn xmlns:p14="http://schemas.microsoft.com/office/powerpoint/2010/main" id="1" dur="indefinite" restart="never" nodeType="tmRoot"/>
       </p:par>
     </p:tnLst>
   </p:timing>
 </p:sld>
 </file>
 
-<file path=ppt/slides/slide15.xml><?xml version="1.0" encoding="utf-8"?>
+<file path=ppt/slides/slide16.xml><?xml version="1.0" encoding="utf-8"?>
 <p:sld xmlns:a="http://schemas.openxmlformats.org/drawingml/2006/main" xmlns:r="http://schemas.openxmlformats.org/officeDocument/2006/relationships" xmlns:p="http://schemas.openxmlformats.org/presentationml/2006/main">
   <p:cSld>
     <p:spTree>
@@ -8581,263 +9722,7 @@
   <p:timing>
     <p:tnLst>
       <p:par>
-        <p:cTn id="1" dur="indefinite" restart="never" nodeType="tmRoot"/>
-      </p:par>
-    </p:tnLst>
-  </p:timing>
-</p:sld>
-</file>
-
-<file path=ppt/slides/slide16.xml><?xml version="1.0" encoding="utf-8"?>
-<p:sld xmlns:a="http://schemas.openxmlformats.org/drawingml/2006/main" xmlns:r="http://schemas.openxmlformats.org/officeDocument/2006/relationships" xmlns:p="http://schemas.openxmlformats.org/presentationml/2006/main">
-  <p:cSld>
-    <p:spTree>
-      <p:nvGrpSpPr>
-        <p:cNvPr id="1" name=""/>
-        <p:cNvGrpSpPr/>
-        <p:nvPr/>
-      </p:nvGrpSpPr>
-      <p:grpSpPr>
-        <a:xfrm>
-          <a:off x="0" y="0"/>
-          <a:ext cx="0" cy="0"/>
-          <a:chOff x="0" y="0"/>
-          <a:chExt cx="0" cy="0"/>
-        </a:xfrm>
-      </p:grpSpPr>
-      <p:sp>
-        <p:nvSpPr>
-          <p:cNvPr id="2" name="标题 1"/>
-          <p:cNvSpPr>
-            <a:spLocks noGrp="1"/>
-          </p:cNvSpPr>
-          <p:nvPr>
-            <p:ph type="title"/>
-          </p:nvPr>
-        </p:nvSpPr>
-        <p:spPr/>
-        <p:txBody>
-          <a:bodyPr/>
-          <a:lstStyle/>
-          <a:p>
-            <a:r>
-              <a:rPr kumimoji="1" lang="en-US" altLang="zh-CN" dirty="0" err="1" smtClean="0"/>
-              <a:t>Con’t</a:t>
-            </a:r>
-            <a:endParaRPr kumimoji="1" lang="zh-CN" altLang="en-US" dirty="0"/>
-          </a:p>
-        </p:txBody>
-      </p:sp>
-      <p:sp>
-        <p:nvSpPr>
-          <p:cNvPr id="3" name="内容占位符 2"/>
-          <p:cNvSpPr>
-            <a:spLocks noGrp="1"/>
-          </p:cNvSpPr>
-          <p:nvPr>
-            <p:ph idx="1"/>
-          </p:nvPr>
-        </p:nvSpPr>
-        <p:spPr>
-          <a:xfrm>
-            <a:off x="628651" y="1825625"/>
-            <a:ext cx="7886700" cy="4351338"/>
-          </a:xfrm>
-        </p:spPr>
-        <p:txBody>
-          <a:bodyPr>
-            <a:noAutofit/>
-          </a:bodyPr>
-          <a:lstStyle/>
-          <a:p>
-            <a:r>
-              <a:rPr kumimoji="1" lang="en-US" altLang="zh-CN" sz="2000" dirty="0" err="1" smtClean="0">
-                <a:solidFill>
-                  <a:schemeClr val="tx1"/>
-                </a:solidFill>
-                <a:latin typeface="Calibri" panose="020F0502020204030204" pitchFamily="34" charset="0"/>
-              </a:rPr>
-              <a:t>Kaggle</a:t>
-            </a:r>
-            <a:r>
-              <a:rPr kumimoji="1" lang="en-US" altLang="zh-CN" sz="2000" dirty="0" smtClean="0">
-                <a:solidFill>
-                  <a:schemeClr val="tx1"/>
-                </a:solidFill>
-                <a:latin typeface="Calibri" panose="020F0502020204030204" pitchFamily="34" charset="0"/>
-              </a:rPr>
-              <a:t> link: </a:t>
-            </a:r>
-            <a:r>
-              <a:rPr lang="en-US" altLang="zh-CN" sz="2000" u="sng" dirty="0">
-                <a:solidFill>
-                  <a:schemeClr val="tx1"/>
-                </a:solidFill>
-                <a:latin typeface="Calibri" panose="020F0502020204030204" pitchFamily="34" charset="0"/>
-                <a:hlinkClick r:id="rId2"/>
-              </a:rPr>
-              <a:t>http://www.kaggle.com/c/avazu-ctr-prediction</a:t>
-            </a:r>
-            <a:r>
-              <a:rPr lang="en-US" altLang="zh-CN" sz="2000" dirty="0">
-                <a:solidFill>
-                  <a:schemeClr val="tx1"/>
-                </a:solidFill>
-                <a:latin typeface="Calibri" panose="020F0502020204030204" pitchFamily="34" charset="0"/>
-              </a:rPr>
-              <a:t> </a:t>
-            </a:r>
-            <a:endParaRPr lang="en-US" altLang="zh-CN" sz="2000" dirty="0" smtClean="0">
-              <a:solidFill>
-                <a:schemeClr val="tx1"/>
-              </a:solidFill>
-              <a:latin typeface="Calibri" panose="020F0502020204030204" pitchFamily="34" charset="0"/>
-            </a:endParaRPr>
-          </a:p>
-          <a:p>
-            <a:r>
-              <a:rPr kumimoji="1" lang="en-US" altLang="zh-CN" sz="2000" dirty="0" err="1" smtClean="0">
-                <a:solidFill>
-                  <a:schemeClr val="tx1"/>
-                </a:solidFill>
-                <a:latin typeface="Calibri" panose="020F0502020204030204" pitchFamily="34" charset="0"/>
-              </a:rPr>
-              <a:t>Github</a:t>
-            </a:r>
-            <a:r>
-              <a:rPr kumimoji="1" lang="en-US" altLang="zh-CN" sz="2000" dirty="0" smtClean="0">
-                <a:solidFill>
-                  <a:schemeClr val="tx1"/>
-                </a:solidFill>
-                <a:latin typeface="Calibri" panose="020F0502020204030204" pitchFamily="34" charset="0"/>
-              </a:rPr>
-              <a:t> link:</a:t>
-            </a:r>
-          </a:p>
-          <a:p>
-            <a:pPr marL="0" indent="0">
-              <a:buNone/>
-            </a:pPr>
-            <a:r>
-              <a:rPr kumimoji="1" lang="en-US" altLang="zh-CN" sz="2000" dirty="0" smtClean="0">
-                <a:solidFill>
-                  <a:schemeClr val="tx1"/>
-                </a:solidFill>
-                <a:latin typeface="Calibri" panose="020F0502020204030204" pitchFamily="34" charset="0"/>
-                <a:hlinkClick r:id="rId3"/>
-              </a:rPr>
-              <a:t>https</a:t>
-            </a:r>
-            <a:r>
-              <a:rPr kumimoji="1" lang="en-US" altLang="zh-CN" sz="2000" dirty="0">
-                <a:solidFill>
-                  <a:schemeClr val="tx1"/>
-                </a:solidFill>
-                <a:latin typeface="Calibri" panose="020F0502020204030204" pitchFamily="34" charset="0"/>
-                <a:hlinkClick r:id="rId3"/>
-              </a:rPr>
-              <a:t>://github.com/Kelvin-Zhong/Click-Through-Rate-</a:t>
-            </a:r>
-            <a:r>
-              <a:rPr kumimoji="1" lang="en-US" altLang="zh-CN" sz="2000" dirty="0" smtClean="0">
-                <a:solidFill>
-                  <a:schemeClr val="tx1"/>
-                </a:solidFill>
-                <a:latin typeface="Calibri" panose="020F0502020204030204" pitchFamily="34" charset="0"/>
-                <a:hlinkClick r:id="rId3"/>
-              </a:rPr>
-              <a:t>Prediction</a:t>
-            </a:r>
-            <a:endParaRPr kumimoji="1" lang="en-US" altLang="zh-CN" sz="2000" dirty="0" smtClean="0">
-              <a:solidFill>
-                <a:schemeClr val="tx1"/>
-              </a:solidFill>
-              <a:latin typeface="Calibri" panose="020F0502020204030204" pitchFamily="34" charset="0"/>
-            </a:endParaRPr>
-          </a:p>
-          <a:p>
-            <a:r>
-              <a:rPr kumimoji="1" lang="en-US" altLang="zh-CN" sz="2000" dirty="0" smtClean="0">
-                <a:solidFill>
-                  <a:schemeClr val="tx1"/>
-                </a:solidFill>
-                <a:latin typeface="Calibri" panose="020F0502020204030204" pitchFamily="34" charset="0"/>
-              </a:rPr>
-              <a:t>Reference:</a:t>
-            </a:r>
-          </a:p>
-          <a:p>
-            <a:pPr marL="0" indent="0">
-              <a:buNone/>
-            </a:pPr>
-            <a:r>
-              <a:rPr lang="en-US" altLang="zh-CN" sz="2000" dirty="0">
-                <a:solidFill>
-                  <a:schemeClr val="tx1"/>
-                </a:solidFill>
-                <a:latin typeface="Calibri" panose="020F0502020204030204" pitchFamily="34" charset="0"/>
-              </a:rPr>
-              <a:t>"A two-stage ensemble of diverse models for advertisement ranking in KDD Cup 2012." </a:t>
-            </a:r>
-            <a:r>
-              <a:rPr lang="en-US" altLang="zh-CN" sz="2000" dirty="0" err="1">
-                <a:solidFill>
-                  <a:schemeClr val="tx1"/>
-                </a:solidFill>
-                <a:latin typeface="Calibri" panose="020F0502020204030204" pitchFamily="34" charset="0"/>
-              </a:rPr>
-              <a:t>KDDCup</a:t>
-            </a:r>
-            <a:r>
-              <a:rPr lang="en-US" altLang="zh-CN" sz="2000" dirty="0">
-                <a:solidFill>
-                  <a:schemeClr val="tx1"/>
-                </a:solidFill>
-                <a:latin typeface="Calibri" panose="020F0502020204030204" pitchFamily="34" charset="0"/>
-              </a:rPr>
-              <a:t> (</a:t>
-            </a:r>
-            <a:r>
-              <a:rPr lang="en-US" altLang="zh-CN" sz="2000">
-                <a:solidFill>
-                  <a:schemeClr val="tx1"/>
-                </a:solidFill>
-                <a:latin typeface="Calibri" panose="020F0502020204030204" pitchFamily="34" charset="0"/>
-              </a:rPr>
-              <a:t>2012</a:t>
-            </a:r>
-            <a:r>
-              <a:rPr lang="en-US" altLang="zh-CN" sz="2000" smtClean="0">
-                <a:solidFill>
-                  <a:schemeClr val="tx1"/>
-                </a:solidFill>
-                <a:latin typeface="Calibri" panose="020F0502020204030204" pitchFamily="34" charset="0"/>
-              </a:rPr>
-              <a:t>).</a:t>
-            </a:r>
-            <a:endParaRPr kumimoji="1" lang="en-US" altLang="zh-CN" sz="2000" dirty="0">
-              <a:solidFill>
-                <a:schemeClr val="tx1"/>
-              </a:solidFill>
-              <a:latin typeface="Calibri" panose="020F0502020204030204" pitchFamily="34" charset="0"/>
-            </a:endParaRPr>
-          </a:p>
-        </p:txBody>
-      </p:sp>
-    </p:spTree>
-    <p:extLst>
-      <p:ext uri="{BB962C8B-B14F-4D97-AF65-F5344CB8AC3E}">
-        <p14:creationId xmlns:p14="http://schemas.microsoft.com/office/powerpoint/2010/main" val="467530572"/>
-      </p:ext>
-    </p:extLst>
-  </p:cSld>
-  <p:clrMapOvr>
-    <a:masterClrMapping/>
-  </p:clrMapOvr>
-  <p:timing>
-    <p:tnLst>
-      <p:par>
-        <p:cTn id="1" dur="indefinite" restart="never" nodeType="tmRoot"/>
+        <p:cTn xmlns:p14="http://schemas.microsoft.com/office/powerpoint/2010/main" id="1" dur="indefinite" restart="never" nodeType="tmRoot"/>
       </p:par>
     </p:tnLst>
   </p:timing>
@@ -8877,6 +9762,262 @@
           <a:lstStyle/>
           <a:p>
             <a:r>
+              <a:rPr kumimoji="1" lang="en-US" altLang="zh-CN" dirty="0" err="1" smtClean="0"/>
+              <a:t>Con’t</a:t>
+            </a:r>
+            <a:endParaRPr kumimoji="1" lang="zh-CN" altLang="en-US" dirty="0"/>
+          </a:p>
+        </p:txBody>
+      </p:sp>
+      <p:sp>
+        <p:nvSpPr>
+          <p:cNvPr id="3" name="内容占位符 2"/>
+          <p:cNvSpPr>
+            <a:spLocks noGrp="1"/>
+          </p:cNvSpPr>
+          <p:nvPr>
+            <p:ph idx="1"/>
+          </p:nvPr>
+        </p:nvSpPr>
+        <p:spPr>
+          <a:xfrm>
+            <a:off x="628651" y="1825625"/>
+            <a:ext cx="7886700" cy="4351338"/>
+          </a:xfrm>
+        </p:spPr>
+        <p:txBody>
+          <a:bodyPr>
+            <a:noAutofit/>
+          </a:bodyPr>
+          <a:lstStyle/>
+          <a:p>
+            <a:r>
+              <a:rPr kumimoji="1" lang="en-US" altLang="zh-CN" sz="2000" dirty="0" err="1" smtClean="0">
+                <a:solidFill>
+                  <a:schemeClr val="tx1"/>
+                </a:solidFill>
+                <a:latin typeface="Calibri" panose="020F0502020204030204" pitchFamily="34" charset="0"/>
+              </a:rPr>
+              <a:t>Kaggle</a:t>
+            </a:r>
+            <a:r>
+              <a:rPr kumimoji="1" lang="en-US" altLang="zh-CN" sz="2000" dirty="0" smtClean="0">
+                <a:solidFill>
+                  <a:schemeClr val="tx1"/>
+                </a:solidFill>
+                <a:latin typeface="Calibri" panose="020F0502020204030204" pitchFamily="34" charset="0"/>
+              </a:rPr>
+              <a:t> link: </a:t>
+            </a:r>
+            <a:r>
+              <a:rPr lang="en-US" altLang="zh-CN" sz="2000" u="sng" dirty="0">
+                <a:solidFill>
+                  <a:schemeClr val="tx1"/>
+                </a:solidFill>
+                <a:latin typeface="Calibri" panose="020F0502020204030204" pitchFamily="34" charset="0"/>
+                <a:hlinkClick r:id="rId2"/>
+              </a:rPr>
+              <a:t>http://www.kaggle.com/c/avazu-ctr-prediction</a:t>
+            </a:r>
+            <a:r>
+              <a:rPr lang="en-US" altLang="zh-CN" sz="2000" dirty="0">
+                <a:solidFill>
+                  <a:schemeClr val="tx1"/>
+                </a:solidFill>
+                <a:latin typeface="Calibri" panose="020F0502020204030204" pitchFamily="34" charset="0"/>
+              </a:rPr>
+              <a:t> </a:t>
+            </a:r>
+            <a:endParaRPr lang="en-US" altLang="zh-CN" sz="2000" dirty="0" smtClean="0">
+              <a:solidFill>
+                <a:schemeClr val="tx1"/>
+              </a:solidFill>
+              <a:latin typeface="Calibri" panose="020F0502020204030204" pitchFamily="34" charset="0"/>
+            </a:endParaRPr>
+          </a:p>
+          <a:p>
+            <a:r>
+              <a:rPr kumimoji="1" lang="en-US" altLang="zh-CN" sz="2000" dirty="0" err="1" smtClean="0">
+                <a:solidFill>
+                  <a:schemeClr val="tx1"/>
+                </a:solidFill>
+                <a:latin typeface="Calibri" panose="020F0502020204030204" pitchFamily="34" charset="0"/>
+              </a:rPr>
+              <a:t>Github</a:t>
+            </a:r>
+            <a:r>
+              <a:rPr kumimoji="1" lang="en-US" altLang="zh-CN" sz="2000" dirty="0" smtClean="0">
+                <a:solidFill>
+                  <a:schemeClr val="tx1"/>
+                </a:solidFill>
+                <a:latin typeface="Calibri" panose="020F0502020204030204" pitchFamily="34" charset="0"/>
+              </a:rPr>
+              <a:t> link:</a:t>
+            </a:r>
+          </a:p>
+          <a:p>
+            <a:pPr marL="0" indent="0">
+              <a:buNone/>
+            </a:pPr>
+            <a:r>
+              <a:rPr kumimoji="1" lang="en-US" altLang="zh-CN" sz="2000" dirty="0" smtClean="0">
+                <a:solidFill>
+                  <a:schemeClr val="tx1"/>
+                </a:solidFill>
+                <a:latin typeface="Calibri" panose="020F0502020204030204" pitchFamily="34" charset="0"/>
+                <a:hlinkClick r:id="rId3"/>
+              </a:rPr>
+              <a:t>https</a:t>
+            </a:r>
+            <a:r>
+              <a:rPr kumimoji="1" lang="en-US" altLang="zh-CN" sz="2000" dirty="0">
+                <a:solidFill>
+                  <a:schemeClr val="tx1"/>
+                </a:solidFill>
+                <a:latin typeface="Calibri" panose="020F0502020204030204" pitchFamily="34" charset="0"/>
+                <a:hlinkClick r:id="rId3"/>
+              </a:rPr>
+              <a:t>://github.com/Kelvin-Zhong/Click-Through-Rate-</a:t>
+            </a:r>
+            <a:r>
+              <a:rPr kumimoji="1" lang="en-US" altLang="zh-CN" sz="2000" dirty="0" smtClean="0">
+                <a:solidFill>
+                  <a:schemeClr val="tx1"/>
+                </a:solidFill>
+                <a:latin typeface="Calibri" panose="020F0502020204030204" pitchFamily="34" charset="0"/>
+                <a:hlinkClick r:id="rId3"/>
+              </a:rPr>
+              <a:t>Prediction</a:t>
+            </a:r>
+            <a:endParaRPr kumimoji="1" lang="en-US" altLang="zh-CN" sz="2000" dirty="0" smtClean="0">
+              <a:solidFill>
+                <a:schemeClr val="tx1"/>
+              </a:solidFill>
+              <a:latin typeface="Calibri" panose="020F0502020204030204" pitchFamily="34" charset="0"/>
+            </a:endParaRPr>
+          </a:p>
+          <a:p>
+            <a:r>
+              <a:rPr kumimoji="1" lang="en-US" altLang="zh-CN" sz="2000" dirty="0" smtClean="0">
+                <a:solidFill>
+                  <a:schemeClr val="tx1"/>
+                </a:solidFill>
+                <a:latin typeface="Calibri" panose="020F0502020204030204" pitchFamily="34" charset="0"/>
+              </a:rPr>
+              <a:t>Reference:</a:t>
+            </a:r>
+          </a:p>
+          <a:p>
+            <a:pPr marL="0" indent="0">
+              <a:buNone/>
+            </a:pPr>
+            <a:r>
+              <a:rPr lang="en-US" altLang="zh-CN" sz="2000" dirty="0">
+                <a:solidFill>
+                  <a:schemeClr val="tx1"/>
+                </a:solidFill>
+                <a:latin typeface="Calibri" panose="020F0502020204030204" pitchFamily="34" charset="0"/>
+              </a:rPr>
+              <a:t>"A two-stage ensemble of diverse models for advertisement ranking in KDD Cup 2012." </a:t>
+            </a:r>
+            <a:r>
+              <a:rPr lang="en-US" altLang="zh-CN" sz="2000" dirty="0" err="1">
+                <a:solidFill>
+                  <a:schemeClr val="tx1"/>
+                </a:solidFill>
+                <a:latin typeface="Calibri" panose="020F0502020204030204" pitchFamily="34" charset="0"/>
+              </a:rPr>
+              <a:t>KDDCup</a:t>
+            </a:r>
+            <a:r>
+              <a:rPr lang="en-US" altLang="zh-CN" sz="2000" dirty="0">
+                <a:solidFill>
+                  <a:schemeClr val="tx1"/>
+                </a:solidFill>
+                <a:latin typeface="Calibri" panose="020F0502020204030204" pitchFamily="34" charset="0"/>
+              </a:rPr>
+              <a:t> (</a:t>
+            </a:r>
+            <a:r>
+              <a:rPr lang="en-US" altLang="zh-CN" sz="2000">
+                <a:solidFill>
+                  <a:schemeClr val="tx1"/>
+                </a:solidFill>
+                <a:latin typeface="Calibri" panose="020F0502020204030204" pitchFamily="34" charset="0"/>
+              </a:rPr>
+              <a:t>2012</a:t>
+            </a:r>
+            <a:r>
+              <a:rPr lang="en-US" altLang="zh-CN" sz="2000" smtClean="0">
+                <a:solidFill>
+                  <a:schemeClr val="tx1"/>
+                </a:solidFill>
+                <a:latin typeface="Calibri" panose="020F0502020204030204" pitchFamily="34" charset="0"/>
+              </a:rPr>
+              <a:t>).</a:t>
+            </a:r>
+            <a:endParaRPr kumimoji="1" lang="en-US" altLang="zh-CN" sz="2000" dirty="0">
+              <a:solidFill>
+                <a:schemeClr val="tx1"/>
+              </a:solidFill>
+              <a:latin typeface="Calibri" panose="020F0502020204030204" pitchFamily="34" charset="0"/>
+            </a:endParaRPr>
+          </a:p>
+        </p:txBody>
+      </p:sp>
+    </p:spTree>
+    <p:extLst>
+      <p:ext uri="{BB962C8B-B14F-4D97-AF65-F5344CB8AC3E}">
+        <p14:creationId xmlns:p14="http://schemas.microsoft.com/office/powerpoint/2010/main" val="467530572"/>
+      </p:ext>
+    </p:extLst>
+  </p:cSld>
+  <p:clrMapOvr>
+    <a:masterClrMapping/>
+  </p:clrMapOvr>
+  <p:timing>
+    <p:tnLst>
+      <p:par>
+        <p:cTn xmlns:p14="http://schemas.microsoft.com/office/powerpoint/2010/main" id="1" dur="indefinite" restart="never" nodeType="tmRoot"/>
+      </p:par>
+    </p:tnLst>
+  </p:timing>
+</p:sld>
+</file>
+
+<file path=ppt/slides/slide18.xml><?xml version="1.0" encoding="utf-8"?>
+<p:sld xmlns:a="http://schemas.openxmlformats.org/drawingml/2006/main" xmlns:r="http://schemas.openxmlformats.org/officeDocument/2006/relationships" xmlns:p="http://schemas.openxmlformats.org/presentationml/2006/main">
+  <p:cSld>
+    <p:spTree>
+      <p:nvGrpSpPr>
+        <p:cNvPr id="1" name=""/>
+        <p:cNvGrpSpPr/>
+        <p:nvPr/>
+      </p:nvGrpSpPr>
+      <p:grpSpPr>
+        <a:xfrm>
+          <a:off x="0" y="0"/>
+          <a:ext cx="0" cy="0"/>
+          <a:chOff x="0" y="0"/>
+          <a:chExt cx="0" cy="0"/>
+        </a:xfrm>
+      </p:grpSpPr>
+      <p:sp>
+        <p:nvSpPr>
+          <p:cNvPr id="2" name="标题 1"/>
+          <p:cNvSpPr>
+            <a:spLocks noGrp="1"/>
+          </p:cNvSpPr>
+          <p:nvPr>
+            <p:ph type="title"/>
+          </p:nvPr>
+        </p:nvSpPr>
+        <p:spPr/>
+        <p:txBody>
+          <a:bodyPr/>
+          <a:lstStyle/>
+          <a:p>
+            <a:r>
               <a:rPr kumimoji="1" lang="en-US" altLang="zh-CN" dirty="0" smtClean="0"/>
               <a:t>Thank you</a:t>
             </a:r>
@@ -8942,7 +10083,7 @@
   <p:timing>
     <p:tnLst>
       <p:par>
-        <p:cTn id="1" dur="indefinite" restart="never" nodeType="tmRoot"/>
+        <p:cTn xmlns:p14="http://schemas.microsoft.com/office/powerpoint/2010/main" id="1" dur="indefinite" restart="never" nodeType="tmRoot"/>
       </p:par>
     </p:tnLst>
   </p:timing>
@@ -9142,7 +10283,7 @@
   <p:timing>
     <p:tnLst>
       <p:par>
-        <p:cTn id="1" dur="indefinite" restart="never" nodeType="tmRoot"/>
+        <p:cTn xmlns:p14="http://schemas.microsoft.com/office/powerpoint/2010/main" id="1" dur="indefinite" restart="never" nodeType="tmRoot"/>
       </p:par>
     </p:tnLst>
   </p:timing>
@@ -9421,7 +10562,7 @@
         </p:spPr>
         <p:txBody>
           <a:bodyPr vert="horz" lIns="91440" tIns="45720" rIns="91440" bIns="45720" rtlCol="0" anchor="ctr">
-            <a:normAutofit/>
+            <a:normAutofit fontScale="92500"/>
           </a:bodyPr>
           <a:lstStyle>
             <a:lvl1pPr algn="ctr" defTabSz="457200" rtl="0" eaLnBrk="1" latinLnBrk="0" hangingPunct="1">
@@ -9475,7 +10616,7 @@
         </p:spPr>
         <p:txBody>
           <a:bodyPr vert="horz" lIns="91440" tIns="45720" rIns="91440" bIns="45720" rtlCol="0" anchor="ctr">
-            <a:normAutofit fontScale="92500"/>
+            <a:normAutofit fontScale="92500" lnSpcReduction="10000"/>
           </a:bodyPr>
           <a:lstStyle>
             <a:lvl1pPr algn="ctr" defTabSz="457200" rtl="0" eaLnBrk="1" latinLnBrk="0" hangingPunct="1">
@@ -9585,7 +10726,7 @@
   <p:timing>
     <p:tnLst>
       <p:par>
-        <p:cTn id="1" dur="indefinite" restart="never" nodeType="tmRoot"/>
+        <p:cTn xmlns:p14="http://schemas.microsoft.com/office/powerpoint/2010/main" id="1" dur="indefinite" restart="never" nodeType="tmRoot"/>
       </p:par>
     </p:tnLst>
   </p:timing>
@@ -9797,7 +10938,7 @@
         </p:nvGraphicFramePr>
         <p:xfrm>
           <a:off x="389465" y="3877282"/>
-          <a:ext cx="8449735" cy="2574742"/>
+          <a:ext cx="8449735" cy="2574741"/>
         </p:xfrm>
         <a:graphic>
           <a:graphicData uri="http://schemas.openxmlformats.org/drawingml/2006/table">
@@ -10834,7 +11975,7 @@
   <p:timing>
     <p:tnLst>
       <p:par>
-        <p:cTn id="1" dur="indefinite" restart="never" nodeType="tmRoot"/>
+        <p:cTn xmlns:p14="http://schemas.microsoft.com/office/powerpoint/2010/main" id="1" dur="indefinite" restart="never" nodeType="tmRoot"/>
       </p:par>
     </p:tnLst>
   </p:timing>
@@ -11146,7 +12287,7 @@
   <p:timing>
     <p:tnLst>
       <p:par>
-        <p:cTn id="1" dur="indefinite" restart="never" nodeType="tmRoot"/>
+        <p:cTn xmlns:p14="http://schemas.microsoft.com/office/powerpoint/2010/main" id="1" dur="indefinite" restart="never" nodeType="tmRoot"/>
       </p:par>
     </p:tnLst>
   </p:timing>
@@ -11264,12 +12405,6 @@
               </a:rPr>
               <a:t>: </a:t>
             </a:r>
-            <a:endParaRPr kumimoji="1" lang="en-US" altLang="zh-CN" sz="2400" smtClean="0">
-              <a:solidFill>
-                <a:schemeClr val="tx1"/>
-              </a:solidFill>
-              <a:latin typeface="Calibri" panose="020F0502020204030204" pitchFamily="34" charset="0"/>
-            </a:endParaRPr>
           </a:p>
           <a:p>
             <a:pPr lvl="1"/>
@@ -11379,7 +12514,7 @@
   <p:timing>
     <p:tnLst>
       <p:par>
-        <p:cTn id="1" dur="indefinite" restart="never" nodeType="tmRoot"/>
+        <p:cTn xmlns:p14="http://schemas.microsoft.com/office/powerpoint/2010/main" id="1" dur="indefinite" restart="never" nodeType="tmRoot"/>
       </p:par>
     </p:tnLst>
   </p:timing>
@@ -11647,7 +12782,7 @@
   <p:timing>
     <p:tnLst>
       <p:par>
-        <p:cTn id="1" dur="indefinite" restart="never" nodeType="tmRoot"/>
+        <p:cTn xmlns:p14="http://schemas.microsoft.com/office/powerpoint/2010/main" id="1" dur="indefinite" restart="never" nodeType="tmRoot"/>
       </p:par>
     </p:tnLst>
   </p:timing>
@@ -11918,7 +13053,7 @@
   <p:timing>
     <p:tnLst>
       <p:par>
-        <p:cTn id="1" dur="indefinite" restart="never" nodeType="tmRoot"/>
+        <p:cTn xmlns:p14="http://schemas.microsoft.com/office/powerpoint/2010/main" id="1" dur="indefinite" restart="never" nodeType="tmRoot"/>
       </p:par>
     </p:tnLst>
   </p:timing>
@@ -12604,7 +13739,7 @@
   <a:extraClrSchemeLst/>
   <a:extLst>
     <a:ext uri="{05A4C25C-085E-4340-85A3-A5531E510DB2}">
-      <thm15:themeFamily xmlns:thm15="http://schemas.microsoft.com/office/thememl/2012/main" name="WelcomeDoc" id="{E1E7EDF9-8B79-4E5D-B508-2301E35CD219}" vid="{4342E303-0389-44F2-B6F0-C13C203CC598}"/>
+      <thm15:themeFamily xmlns:thm15="http://schemas.microsoft.com/office/thememl/2012/main" xmlns="" name="WelcomeDoc" id="{E1E7EDF9-8B79-4E5D-B508-2301E35CD219}" vid="{4342E303-0389-44F2-B6F0-C13C203CC598}"/>
     </a:ext>
   </a:extLst>
 </a:theme>

</xml_diff>